<commit_message>
continiued doing methods. not good at all.
</commit_message>
<xml_diff>
--- a/ניטור סטטיסטי וזיהוי אנומליות - פרויקט - קבוצה 7.pptx
+++ b/ניטור סטטיסטי וזיהוי אנומליות - פרויקט - קבוצה 7.pptx
@@ -8,6 +8,7 @@
     <p:sldId id="256" r:id="rId2"/>
     <p:sldId id="257" r:id="rId3"/>
     <p:sldId id="258" r:id="rId4"/>
+    <p:sldId id="259" r:id="rId5"/>
   </p:sldIdLst>
   <p:sldSz cx="12192000" cy="6858000"/>
   <p:notesSz cx="6858000" cy="9144000"/>
@@ -106,6 +107,11 @@
       </a:defRPr>
     </a:lvl9pPr>
   </p:defaultTextStyle>
+  <p:extLst>
+    <p:ext uri="{EFAFB233-063F-42B5-8137-9DF3F51BA10A}">
+      <p15:sldGuideLst xmlns:p15="http://schemas.microsoft.com/office/powerpoint/2012/main"/>
+    </p:ext>
+  </p:extLst>
 </p:presentation>
 </file>
 
@@ -4143,6 +4149,14 @@
 <file path=ppt/slides/slide3.xml><?xml version="1.0" encoding="utf-8"?>
 <p:sld xmlns:a="http://schemas.openxmlformats.org/drawingml/2006/main" xmlns:r="http://schemas.openxmlformats.org/officeDocument/2006/relationships" xmlns:p="http://schemas.openxmlformats.org/presentationml/2006/main">
   <p:cSld>
+    <p:bg>
+      <p:bgPr>
+        <a:solidFill>
+          <a:schemeClr val="bg1"/>
+        </a:solidFill>
+        <a:effectLst/>
+      </p:bgPr>
+    </p:bg>
     <p:spTree>
       <p:nvGrpSpPr>
         <p:cNvPr id="1" name=""/>
@@ -4157,6 +4171,218 @@
           <a:chExt cx="0" cy="0"/>
         </a:xfrm>
       </p:grpSpPr>
+      <p:sp useBgFill="1">
+        <p:nvSpPr>
+          <p:cNvPr id="9" name="!!BGRectangle">
+            <a:extLst>
+              <a:ext uri="{FF2B5EF4-FFF2-40B4-BE49-F238E27FC236}">
+                <a16:creationId xmlns:a16="http://schemas.microsoft.com/office/drawing/2014/main" id="{25E8815A-9407-4234-B08F-A1E49DCD7F37}"/>
+              </a:ext>
+              <a:ext uri="{C183D7F6-B498-43B3-948B-1728B52AA6E4}">
+                <adec:decorative xmlns:adec="http://schemas.microsoft.com/office/drawing/2017/decorative" val="1"/>
+              </a:ext>
+            </a:extLst>
+          </p:cNvPr>
+          <p:cNvSpPr>
+            <a:spLocks noGrp="1" noRot="1" noChangeAspect="1" noMove="1" noResize="1" noEditPoints="1" noAdjustHandles="1" noChangeArrowheads="1" noChangeShapeType="1" noTextEdit="1"/>
+          </p:cNvSpPr>
+          <p:nvPr>
+            <p:extLst>
+              <p:ext uri="{386F3935-93C4-4BCD-93E2-E3B085C9AB24}">
+                <p16:designElem xmlns:p16="http://schemas.microsoft.com/office/powerpoint/2015/main" val="1"/>
+              </p:ext>
+            </p:extLst>
+          </p:nvPr>
+        </p:nvSpPr>
+        <p:spPr>
+          <a:xfrm>
+            <a:off x="3048" y="-6182"/>
+            <a:ext cx="12188952" cy="6858000"/>
+          </a:xfrm>
+          <a:prstGeom prst="rect">
+            <a:avLst/>
+          </a:prstGeom>
+          <a:ln>
+            <a:noFill/>
+          </a:ln>
+        </p:spPr>
+        <p:style>
+          <a:lnRef idx="2">
+            <a:schemeClr val="accent1">
+              <a:shade val="50000"/>
+            </a:schemeClr>
+          </a:lnRef>
+          <a:fillRef idx="1">
+            <a:schemeClr val="accent1"/>
+          </a:fillRef>
+          <a:effectRef idx="0">
+            <a:schemeClr val="accent1"/>
+          </a:effectRef>
+          <a:fontRef idx="minor">
+            <a:schemeClr val="lt1"/>
+          </a:fontRef>
+        </p:style>
+        <p:txBody>
+          <a:bodyPr rtlCol="0" anchor="ctr"/>
+          <a:lstStyle/>
+          <a:p>
+            <a:pPr marL="0" marR="0" lvl="0" indent="0" algn="ctr" defTabSz="914400" rtl="0" eaLnBrk="1" fontAlgn="auto" latinLnBrk="0" hangingPunct="1">
+              <a:lnSpc>
+                <a:spcPct val="100000"/>
+              </a:lnSpc>
+              <a:spcBef>
+                <a:spcPts val="0"/>
+              </a:spcBef>
+              <a:spcAft>
+                <a:spcPts val="0"/>
+              </a:spcAft>
+              <a:buClrTx/>
+              <a:buSzTx/>
+              <a:buFontTx/>
+              <a:buNone/>
+              <a:tabLst/>
+              <a:defRPr/>
+            </a:pPr>
+            <a:endParaRPr kumimoji="0" lang="en-US" sz="1800" b="0" i="0" u="none" strike="noStrike" kern="1200" cap="none" spc="0" normalizeH="0" baseline="0" noProof="0">
+              <a:ln>
+                <a:noFill/>
+              </a:ln>
+              <a:solidFill>
+                <a:prstClr val="white"/>
+              </a:solidFill>
+              <a:effectLst/>
+              <a:uLnTx/>
+              <a:uFillTx/>
+              <a:latin typeface="Calibri" panose="020F0502020204030204"/>
+              <a:ea typeface="+mn-ea"/>
+              <a:cs typeface="+mn-cs"/>
+            </a:endParaRPr>
+          </a:p>
+        </p:txBody>
+      </p:sp>
+      <p:sp>
+        <p:nvSpPr>
+          <p:cNvPr id="11" name="Rectangle 10">
+            <a:extLst>
+              <a:ext uri="{FF2B5EF4-FFF2-40B4-BE49-F238E27FC236}">
+                <a16:creationId xmlns:a16="http://schemas.microsoft.com/office/drawing/2014/main" id="{AD72D4D1-076F-49D3-9889-EFC4F6D7CA66}"/>
+              </a:ext>
+              <a:ext uri="{C183D7F6-B498-43B3-948B-1728B52AA6E4}">
+                <adec:decorative xmlns:adec="http://schemas.microsoft.com/office/drawing/2017/decorative" val="1"/>
+              </a:ext>
+            </a:extLst>
+          </p:cNvPr>
+          <p:cNvSpPr>
+            <a:spLocks noGrp="1" noRot="1" noChangeAspect="1" noMove="1" noResize="1" noEditPoints="1" noAdjustHandles="1" noChangeArrowheads="1" noChangeShapeType="1" noTextEdit="1"/>
+          </p:cNvSpPr>
+          <p:nvPr>
+            <p:extLst>
+              <p:ext uri="{386F3935-93C4-4BCD-93E2-E3B085C9AB24}">
+                <p16:designElem xmlns:p16="http://schemas.microsoft.com/office/powerpoint/2015/main" val="1"/>
+              </p:ext>
+            </p:extLst>
+          </p:nvPr>
+        </p:nvSpPr>
+        <p:spPr>
+          <a:xfrm>
+            <a:off x="0" y="0"/>
+            <a:ext cx="12192000" cy="6858000"/>
+          </a:xfrm>
+          <a:prstGeom prst="rect">
+            <a:avLst/>
+          </a:prstGeom>
+          <a:solidFill>
+            <a:srgbClr val="000000"/>
+          </a:solidFill>
+          <a:ln>
+            <a:noFill/>
+          </a:ln>
+        </p:spPr>
+        <p:style>
+          <a:lnRef idx="2">
+            <a:schemeClr val="accent1">
+              <a:shade val="50000"/>
+            </a:schemeClr>
+          </a:lnRef>
+          <a:fillRef idx="1">
+            <a:schemeClr val="accent1"/>
+          </a:fillRef>
+          <a:effectRef idx="0">
+            <a:schemeClr val="accent1"/>
+          </a:effectRef>
+          <a:fontRef idx="minor">
+            <a:schemeClr val="lt1"/>
+          </a:fontRef>
+        </p:style>
+        <p:txBody>
+          <a:bodyPr rtlCol="0" anchor="ctr"/>
+          <a:lstStyle/>
+          <a:p>
+            <a:pPr marL="0" marR="0" lvl="0" indent="0" algn="ctr" defTabSz="914400" rtl="0" eaLnBrk="1" fontAlgn="auto" latinLnBrk="0" hangingPunct="1">
+              <a:lnSpc>
+                <a:spcPct val="100000"/>
+              </a:lnSpc>
+              <a:spcBef>
+                <a:spcPts val="0"/>
+              </a:spcBef>
+              <a:spcAft>
+                <a:spcPts val="0"/>
+              </a:spcAft>
+              <a:buClrTx/>
+              <a:buSzTx/>
+              <a:buFontTx/>
+              <a:buNone/>
+              <a:tabLst/>
+              <a:defRPr/>
+            </a:pPr>
+            <a:endParaRPr kumimoji="0" lang="en-US" sz="1800" b="0" i="0" u="none" strike="noStrike" kern="1200" cap="none" spc="0" normalizeH="0" baseline="0" noProof="0">
+              <a:ln>
+                <a:noFill/>
+              </a:ln>
+              <a:solidFill>
+                <a:prstClr val="white"/>
+              </a:solidFill>
+              <a:effectLst/>
+              <a:uLnTx/>
+              <a:uFillTx/>
+              <a:latin typeface="Calibri" panose="020F0502020204030204"/>
+              <a:ea typeface="+mn-ea"/>
+              <a:cs typeface="+mn-cs"/>
+            </a:endParaRPr>
+          </a:p>
+        </p:txBody>
+      </p:sp>
+      <p:pic>
+        <p:nvPicPr>
+          <p:cNvPr id="5" name="Picture 4" descr="רקע מטושטש מופשט של חנות כלבו">
+            <a:extLst>
+              <a:ext uri="{FF2B5EF4-FFF2-40B4-BE49-F238E27FC236}">
+                <a16:creationId xmlns:a16="http://schemas.microsoft.com/office/drawing/2014/main" id="{832E4EF2-9A90-34C3-AE1D-0167CB9629FF}"/>
+              </a:ext>
+            </a:extLst>
+          </p:cNvPr>
+          <p:cNvPicPr>
+            <a:picLocks noChangeAspect="1"/>
+          </p:cNvPicPr>
+          <p:nvPr/>
+        </p:nvPicPr>
+        <p:blipFill rotWithShape="1">
+          <a:blip r:embed="rId2">
+            <a:alphaModFix amt="50000"/>
+          </a:blip>
+          <a:srcRect b="15730"/>
+          <a:stretch/>
+        </p:blipFill>
+        <p:spPr>
+          <a:xfrm>
+            <a:off x="20" y="1"/>
+            <a:ext cx="12191980" cy="6857999"/>
+          </a:xfrm>
+          <a:prstGeom prst="rect">
+            <a:avLst/>
+          </a:prstGeom>
+        </p:spPr>
+      </p:pic>
       <p:sp>
         <p:nvSpPr>
           <p:cNvPr id="2" name="כותרת 1">
@@ -4173,13 +4399,24 @@
             <p:ph type="title"/>
           </p:nvPr>
         </p:nvSpPr>
-        <p:spPr/>
-        <p:txBody>
-          <a:bodyPr/>
-          <a:lstStyle/>
-          <a:p>
-            <a:r>
-              <a:rPr lang="he-IL" dirty="0"/>
+        <p:spPr>
+          <a:xfrm>
+            <a:off x="838200" y="963877"/>
+            <a:ext cx="3494362" cy="4930246"/>
+          </a:xfrm>
+        </p:spPr>
+        <p:txBody>
+          <a:bodyPr>
+            <a:normAutofit/>
+          </a:bodyPr>
+          <a:lstStyle/>
+          <a:p>
+            <a:r>
+              <a:rPr lang="he-IL">
+                <a:solidFill>
+                  <a:schemeClr val="bg1"/>
+                </a:solidFill>
+              </a:rPr>
               <a:t>שאלת הפרויקט</a:t>
             </a:r>
           </a:p>
@@ -4187,6 +4424,98 @@
       </p:sp>
       <p:sp>
         <p:nvSpPr>
+          <p:cNvPr id="13" name="!!Line">
+            <a:extLst>
+              <a:ext uri="{FF2B5EF4-FFF2-40B4-BE49-F238E27FC236}">
+                <a16:creationId xmlns:a16="http://schemas.microsoft.com/office/drawing/2014/main" id="{C9C56819-FD02-4626-ABF5-85C7463C990D}"/>
+              </a:ext>
+              <a:ext uri="{C183D7F6-B498-43B3-948B-1728B52AA6E4}">
+                <adec:decorative xmlns:adec="http://schemas.microsoft.com/office/drawing/2017/decorative" val="1"/>
+              </a:ext>
+            </a:extLst>
+          </p:cNvPr>
+          <p:cNvSpPr>
+            <a:spLocks noGrp="1" noRot="1" noChangeAspect="1" noMove="1" noResize="1" noEditPoints="1" noAdjustHandles="1" noChangeArrowheads="1" noChangeShapeType="1" noTextEdit="1"/>
+          </p:cNvSpPr>
+          <p:nvPr>
+            <p:extLst>
+              <p:ext uri="{386F3935-93C4-4BCD-93E2-E3B085C9AB24}">
+                <p16:designElem xmlns:p16="http://schemas.microsoft.com/office/powerpoint/2015/main" val="1"/>
+              </p:ext>
+            </p:extLst>
+          </p:nvPr>
+        </p:nvSpPr>
+        <p:spPr>
+          <a:xfrm>
+            <a:off x="4640580" y="2057400"/>
+            <a:ext cx="27432" cy="2743200"/>
+          </a:xfrm>
+          <a:prstGeom prst="rect">
+            <a:avLst/>
+          </a:prstGeom>
+          <a:solidFill>
+            <a:srgbClr val="FFFFFF"/>
+          </a:solidFill>
+          <a:ln>
+            <a:noFill/>
+          </a:ln>
+        </p:spPr>
+        <p:style>
+          <a:lnRef idx="2">
+            <a:schemeClr val="accent1">
+              <a:shade val="50000"/>
+            </a:schemeClr>
+          </a:lnRef>
+          <a:fillRef idx="1">
+            <a:schemeClr val="accent1"/>
+          </a:fillRef>
+          <a:effectRef idx="0">
+            <a:schemeClr val="accent1"/>
+          </a:effectRef>
+          <a:fontRef idx="minor">
+            <a:schemeClr val="lt1"/>
+          </a:fontRef>
+        </p:style>
+        <p:txBody>
+          <a:bodyPr rtlCol="0" anchor="ctr"/>
+          <a:lstStyle/>
+          <a:p>
+            <a:pPr marL="0" marR="0" lvl="0" indent="0" algn="ctr" defTabSz="914400" rtl="0" eaLnBrk="1" fontAlgn="auto" latinLnBrk="0" hangingPunct="1">
+              <a:lnSpc>
+                <a:spcPct val="100000"/>
+              </a:lnSpc>
+              <a:spcBef>
+                <a:spcPts val="0"/>
+              </a:spcBef>
+              <a:spcAft>
+                <a:spcPts val="0"/>
+              </a:spcAft>
+              <a:buClrTx/>
+              <a:buSzTx/>
+              <a:buFontTx/>
+              <a:buNone/>
+              <a:tabLst/>
+              <a:defRPr/>
+            </a:pPr>
+            <a:endParaRPr kumimoji="0" lang="en-US" sz="1800" b="0" i="0" u="none" strike="noStrike" kern="1200" cap="none" spc="0" normalizeH="0" baseline="0" noProof="0">
+              <a:ln>
+                <a:noFill/>
+              </a:ln>
+              <a:solidFill>
+                <a:prstClr val="white"/>
+              </a:solidFill>
+              <a:effectLst/>
+              <a:uLnTx/>
+              <a:uFillTx/>
+              <a:latin typeface="Calibri" panose="020F0502020204030204"/>
+              <a:ea typeface="+mn-ea"/>
+              <a:cs typeface="+mn-cs"/>
+            </a:endParaRPr>
+          </a:p>
+        </p:txBody>
+      </p:sp>
+      <p:sp>
+        <p:nvSpPr>
           <p:cNvPr id="3" name="מציין מיקום תוכן 2">
             <a:extLst>
               <a:ext uri="{FF2B5EF4-FFF2-40B4-BE49-F238E27FC236}">
@@ -4201,12 +4530,36 @@
             <p:ph idx="1"/>
           </p:nvPr>
         </p:nvSpPr>
-        <p:spPr/>
-        <p:txBody>
-          <a:bodyPr/>
-          <a:lstStyle/>
-          <a:p>
-            <a:endParaRPr lang="he-IL"/>
+        <p:spPr>
+          <a:xfrm>
+            <a:off x="4976031" y="963877"/>
+            <a:ext cx="6377769" cy="4930246"/>
+          </a:xfrm>
+        </p:spPr>
+        <p:txBody>
+          <a:bodyPr anchor="ctr">
+            <a:normAutofit/>
+          </a:bodyPr>
+          <a:lstStyle/>
+          <a:p>
+            <a:r>
+              <a:rPr lang="he-IL" sz="2400">
+                <a:solidFill>
+                  <a:schemeClr val="bg1"/>
+                </a:solidFill>
+              </a:rPr>
+              <a:t>זיהוי חנויות עם ביצועים נמוכים בהשוואה למגמות המכירות הכוללות של החברה.</a:t>
+            </a:r>
+          </a:p>
+          <a:p>
+            <a:r>
+              <a:rPr lang="he-IL" sz="2400">
+                <a:solidFill>
+                  <a:schemeClr val="bg1"/>
+                </a:solidFill>
+              </a:rPr>
+              <a:t>על ידי ניתוח נתוני מכירות היסטוריים, ייתכן שניתן יהיה לזהות חנויות עם מכירות נמוכות באופן עקבי מהצפוי בהתבסס על גורמים כגון מיקום, גודל החנות ואירועי קידום מכירות. לאחר מכן ניתן יהיה להשתמש במידע זה כדי למקד לחנויות אלו משאבים נוספים או התערבויות על מנת לשפר את הביצועים שלהן (משקיעים).</a:t>
+            </a:r>
           </a:p>
         </p:txBody>
       </p:sp>
@@ -4214,6 +4567,708 @@
     <p:extLst>
       <p:ext uri="{BB962C8B-B14F-4D97-AF65-F5344CB8AC3E}">
         <p14:creationId xmlns:p14="http://schemas.microsoft.com/office/powerpoint/2010/main" val="1570891149"/>
+      </p:ext>
+    </p:extLst>
+  </p:cSld>
+  <p:clrMapOvr>
+    <a:masterClrMapping/>
+  </p:clrMapOvr>
+</p:sld>
+</file>
+
+<file path=ppt/slides/slide4.xml><?xml version="1.0" encoding="utf-8"?>
+<p:sld xmlns:a="http://schemas.openxmlformats.org/drawingml/2006/main" xmlns:r="http://schemas.openxmlformats.org/officeDocument/2006/relationships" xmlns:p="http://schemas.openxmlformats.org/presentationml/2006/main">
+  <p:cSld>
+    <p:bg>
+      <p:bgPr>
+        <a:solidFill>
+          <a:schemeClr val="tx1"/>
+        </a:solidFill>
+        <a:effectLst/>
+      </p:bgPr>
+    </p:bg>
+    <p:spTree>
+      <p:nvGrpSpPr>
+        <p:cNvPr id="1" name=""/>
+        <p:cNvGrpSpPr/>
+        <p:nvPr/>
+      </p:nvGrpSpPr>
+      <p:grpSpPr>
+        <a:xfrm>
+          <a:off x="0" y="0"/>
+          <a:ext cx="0" cy="0"/>
+          <a:chOff x="0" y="0"/>
+          <a:chExt cx="0" cy="0"/>
+        </a:xfrm>
+      </p:grpSpPr>
+      <p:sp useBgFill="1">
+        <p:nvSpPr>
+          <p:cNvPr id="12" name="Rectangle 8">
+            <a:extLst>
+              <a:ext uri="{FF2B5EF4-FFF2-40B4-BE49-F238E27FC236}">
+                <a16:creationId xmlns:a16="http://schemas.microsoft.com/office/drawing/2014/main" id="{2C61293E-6EBE-43EF-A52C-9BEBFD7679D4}"/>
+              </a:ext>
+              <a:ext uri="{C183D7F6-B498-43B3-948B-1728B52AA6E4}">
+                <adec:decorative xmlns:adec="http://schemas.microsoft.com/office/drawing/2017/decorative" val="1"/>
+              </a:ext>
+            </a:extLst>
+          </p:cNvPr>
+          <p:cNvSpPr>
+            <a:spLocks noGrp="1" noRot="1" noChangeAspect="1" noMove="1" noResize="1" noEditPoints="1" noAdjustHandles="1" noChangeArrowheads="1" noChangeShapeType="1" noTextEdit="1"/>
+          </p:cNvSpPr>
+          <p:nvPr>
+            <p:extLst>
+              <p:ext uri="{386F3935-93C4-4BCD-93E2-E3B085C9AB24}">
+                <p16:designElem xmlns:p16="http://schemas.microsoft.com/office/powerpoint/2015/main" val="1"/>
+              </p:ext>
+            </p:extLst>
+          </p:nvPr>
+        </p:nvSpPr>
+        <p:spPr>
+          <a:xfrm>
+            <a:off x="0" y="0"/>
+            <a:ext cx="12188952" cy="6858000"/>
+          </a:xfrm>
+          <a:prstGeom prst="rect">
+            <a:avLst/>
+          </a:prstGeom>
+          <a:ln>
+            <a:noFill/>
+          </a:ln>
+        </p:spPr>
+        <p:style>
+          <a:lnRef idx="2">
+            <a:schemeClr val="accent1">
+              <a:shade val="50000"/>
+            </a:schemeClr>
+          </a:lnRef>
+          <a:fillRef idx="1">
+            <a:schemeClr val="accent1"/>
+          </a:fillRef>
+          <a:effectRef idx="0">
+            <a:schemeClr val="accent1"/>
+          </a:effectRef>
+          <a:fontRef idx="minor">
+            <a:schemeClr val="lt1"/>
+          </a:fontRef>
+        </p:style>
+        <p:txBody>
+          <a:bodyPr rtlCol="0" anchor="ctr"/>
+          <a:lstStyle/>
+          <a:p>
+            <a:pPr algn="ctr"/>
+            <a:endParaRPr lang="en-US"/>
+          </a:p>
+        </p:txBody>
+      </p:sp>
+      <p:sp>
+        <p:nvSpPr>
+          <p:cNvPr id="2" name="כותרת 1">
+            <a:extLst>
+              <a:ext uri="{FF2B5EF4-FFF2-40B4-BE49-F238E27FC236}">
+                <a16:creationId xmlns:a16="http://schemas.microsoft.com/office/drawing/2014/main" id="{734FA42E-61EA-9CA4-17E2-AC1F483F696A}"/>
+              </a:ext>
+            </a:extLst>
+          </p:cNvPr>
+          <p:cNvSpPr>
+            <a:spLocks noGrp="1"/>
+          </p:cNvSpPr>
+          <p:nvPr>
+            <p:ph type="title"/>
+          </p:nvPr>
+        </p:nvSpPr>
+        <p:spPr>
+          <a:xfrm>
+            <a:off x="5297762" y="329184"/>
+            <a:ext cx="6251110" cy="1783080"/>
+          </a:xfrm>
+        </p:spPr>
+        <p:txBody>
+          <a:bodyPr anchor="b">
+            <a:normAutofit/>
+          </a:bodyPr>
+          <a:lstStyle/>
+          <a:p>
+            <a:r>
+              <a:rPr lang="he-IL" sz="5400">
+                <a:solidFill>
+                  <a:schemeClr val="bg1"/>
+                </a:solidFill>
+              </a:rPr>
+              <a:t>שיטות שנשתמש בהם בפרויקט</a:t>
+            </a:r>
+          </a:p>
+        </p:txBody>
+      </p:sp>
+      <p:pic>
+        <p:nvPicPr>
+          <p:cNvPr id="13" name="Picture 4" descr="גרף">
+            <a:extLst>
+              <a:ext uri="{FF2B5EF4-FFF2-40B4-BE49-F238E27FC236}">
+                <a16:creationId xmlns:a16="http://schemas.microsoft.com/office/drawing/2014/main" id="{522AAACC-71C5-EDD9-480A-087D4921A19A}"/>
+              </a:ext>
+            </a:extLst>
+          </p:cNvPr>
+          <p:cNvPicPr>
+            <a:picLocks noChangeAspect="1"/>
+          </p:cNvPicPr>
+          <p:nvPr/>
+        </p:nvPicPr>
+        <p:blipFill rotWithShape="1">
+          <a:blip r:embed="rId2"/>
+          <a:srcRect l="23145" r="34411"/>
+          <a:stretch/>
+        </p:blipFill>
+        <p:spPr>
+          <a:xfrm>
+            <a:off x="1" y="10"/>
+            <a:ext cx="4657344" cy="6857990"/>
+          </a:xfrm>
+          <a:custGeom>
+            <a:avLst/>
+            <a:gdLst/>
+            <a:ahLst/>
+            <a:cxnLst/>
+            <a:rect l="l" t="t" r="r" b="b"/>
+            <a:pathLst>
+              <a:path w="4657344" h="6858000">
+                <a:moveTo>
+                  <a:pt x="0" y="0"/>
+                </a:moveTo>
+                <a:lnTo>
+                  <a:pt x="3429755" y="0"/>
+                </a:lnTo>
+                <a:lnTo>
+                  <a:pt x="3526016" y="148742"/>
+                </a:lnTo>
+                <a:cubicBezTo>
+                  <a:pt x="3657740" y="365513"/>
+                  <a:pt x="3777402" y="589569"/>
+                  <a:pt x="3886489" y="819975"/>
+                </a:cubicBezTo>
+                <a:cubicBezTo>
+                  <a:pt x="3891856" y="833492"/>
+                  <a:pt x="3900663" y="845393"/>
+                  <a:pt x="3912049" y="854514"/>
+                </a:cubicBezTo>
+                <a:cubicBezTo>
+                  <a:pt x="3897352" y="819849"/>
+                  <a:pt x="3883037" y="784928"/>
+                  <a:pt x="3868083" y="750263"/>
+                </a:cubicBezTo>
+                <a:cubicBezTo>
+                  <a:pt x="3806989" y="608712"/>
+                  <a:pt x="3742478" y="469145"/>
+                  <a:pt x="3674155" y="331786"/>
+                </a:cubicBezTo>
+                <a:lnTo>
+                  <a:pt x="3496656" y="0"/>
+                </a:lnTo>
+                <a:lnTo>
+                  <a:pt x="3554371" y="0"/>
+                </a:lnTo>
+                <a:lnTo>
+                  <a:pt x="3661621" y="196614"/>
+                </a:lnTo>
+                <a:cubicBezTo>
+                  <a:pt x="3856899" y="573253"/>
+                  <a:pt x="4021071" y="966066"/>
+                  <a:pt x="4161279" y="1371196"/>
+                </a:cubicBezTo>
+                <a:cubicBezTo>
+                  <a:pt x="4379525" y="2007265"/>
+                  <a:pt x="4530141" y="2664286"/>
+                  <a:pt x="4610660" y="3331516"/>
+                </a:cubicBezTo>
+                <a:cubicBezTo>
+                  <a:pt x="4652837" y="3672965"/>
+                  <a:pt x="4671625" y="4013908"/>
+                  <a:pt x="4645040" y="4357388"/>
+                </a:cubicBezTo>
+                <a:cubicBezTo>
+                  <a:pt x="4613599" y="4758899"/>
+                  <a:pt x="4566181" y="5157998"/>
+                  <a:pt x="4485789" y="5552906"/>
+                </a:cubicBezTo>
+                <a:cubicBezTo>
+                  <a:pt x="4397121" y="5988893"/>
+                  <a:pt x="4276748" y="6414594"/>
+                  <a:pt x="4117769" y="6828295"/>
+                </a:cubicBezTo>
+                <a:lnTo>
+                  <a:pt x="4105288" y="6858000"/>
+                </a:lnTo>
+                <a:lnTo>
+                  <a:pt x="4052520" y="6858000"/>
+                </a:lnTo>
+                <a:lnTo>
+                  <a:pt x="4059369" y="6841549"/>
+                </a:lnTo>
+                <a:cubicBezTo>
+                  <a:pt x="4147276" y="6614016"/>
+                  <a:pt x="4224193" y="6380817"/>
+                  <a:pt x="4291518" y="6142729"/>
+                </a:cubicBezTo>
+                <a:cubicBezTo>
+                  <a:pt x="4350055" y="5935370"/>
+                  <a:pt x="4393256" y="5723695"/>
+                  <a:pt x="4443357" y="5513923"/>
+                </a:cubicBezTo>
+                <a:cubicBezTo>
+                  <a:pt x="4444541" y="5502788"/>
+                  <a:pt x="4445137" y="5491601"/>
+                  <a:pt x="4445146" y="5480401"/>
+                </a:cubicBezTo>
+                <a:cubicBezTo>
+                  <a:pt x="4408465" y="5607635"/>
+                  <a:pt x="4379196" y="5719759"/>
+                  <a:pt x="4344559" y="5830359"/>
+                </a:cubicBezTo>
+                <a:cubicBezTo>
+                  <a:pt x="4254261" y="6118381"/>
+                  <a:pt x="4150112" y="6398531"/>
+                  <a:pt x="4031702" y="6670527"/>
+                </a:cubicBezTo>
+                <a:lnTo>
+                  <a:pt x="3943824" y="6858000"/>
+                </a:lnTo>
+                <a:lnTo>
+                  <a:pt x="0" y="6858000"/>
+                </a:lnTo>
+                <a:close/>
+              </a:path>
+            </a:pathLst>
+          </a:custGeom>
+        </p:spPr>
+      </p:pic>
+      <p:sp>
+        <p:nvSpPr>
+          <p:cNvPr id="11" name="sketchy line">
+            <a:extLst>
+              <a:ext uri="{FF2B5EF4-FFF2-40B4-BE49-F238E27FC236}">
+                <a16:creationId xmlns:a16="http://schemas.microsoft.com/office/drawing/2014/main" id="{21540236-BFD5-4A9D-8840-4703E7F76825}"/>
+              </a:ext>
+              <a:ext uri="{C183D7F6-B498-43B3-948B-1728B52AA6E4}">
+                <adec:decorative xmlns:adec="http://schemas.microsoft.com/office/drawing/2017/decorative" val="1"/>
+              </a:ext>
+            </a:extLst>
+          </p:cNvPr>
+          <p:cNvSpPr>
+            <a:spLocks noGrp="1" noRot="1" noChangeAspect="1" noMove="1" noResize="1" noEditPoints="1" noAdjustHandles="1" noChangeArrowheads="1" noChangeShapeType="1" noTextEdit="1"/>
+          </p:cNvSpPr>
+          <p:nvPr>
+            <p:extLst>
+              <p:ext uri="{386F3935-93C4-4BCD-93E2-E3B085C9AB24}">
+                <p16:designElem xmlns:p16="http://schemas.microsoft.com/office/powerpoint/2015/main" val="1"/>
+              </p:ext>
+            </p:extLst>
+          </p:nvPr>
+        </p:nvSpPr>
+        <p:spPr>
+          <a:xfrm>
+            <a:off x="5297762" y="2374947"/>
+            <a:ext cx="4243589" cy="18288"/>
+          </a:xfrm>
+          <a:custGeom>
+            <a:avLst/>
+            <a:gdLst>
+              <a:gd name="connsiteX0" fmla="*/ 0 w 4243589"/>
+              <a:gd name="connsiteY0" fmla="*/ 0 h 18288"/>
+              <a:gd name="connsiteX1" fmla="*/ 478919 w 4243589"/>
+              <a:gd name="connsiteY1" fmla="*/ 0 h 18288"/>
+              <a:gd name="connsiteX2" fmla="*/ 957839 w 4243589"/>
+              <a:gd name="connsiteY2" fmla="*/ 0 h 18288"/>
+              <a:gd name="connsiteX3" fmla="*/ 1521630 w 4243589"/>
+              <a:gd name="connsiteY3" fmla="*/ 0 h 18288"/>
+              <a:gd name="connsiteX4" fmla="*/ 2212729 w 4243589"/>
+              <a:gd name="connsiteY4" fmla="*/ 0 h 18288"/>
+              <a:gd name="connsiteX5" fmla="*/ 2734084 w 4243589"/>
+              <a:gd name="connsiteY5" fmla="*/ 0 h 18288"/>
+              <a:gd name="connsiteX6" fmla="*/ 3255439 w 4243589"/>
+              <a:gd name="connsiteY6" fmla="*/ 0 h 18288"/>
+              <a:gd name="connsiteX7" fmla="*/ 4243589 w 4243589"/>
+              <a:gd name="connsiteY7" fmla="*/ 0 h 18288"/>
+              <a:gd name="connsiteX8" fmla="*/ 4243589 w 4243589"/>
+              <a:gd name="connsiteY8" fmla="*/ 18288 h 18288"/>
+              <a:gd name="connsiteX9" fmla="*/ 3594926 w 4243589"/>
+              <a:gd name="connsiteY9" fmla="*/ 18288 h 18288"/>
+              <a:gd name="connsiteX10" fmla="*/ 3073571 w 4243589"/>
+              <a:gd name="connsiteY10" fmla="*/ 18288 h 18288"/>
+              <a:gd name="connsiteX11" fmla="*/ 2552216 w 4243589"/>
+              <a:gd name="connsiteY11" fmla="*/ 18288 h 18288"/>
+              <a:gd name="connsiteX12" fmla="*/ 1903553 w 4243589"/>
+              <a:gd name="connsiteY12" fmla="*/ 18288 h 18288"/>
+              <a:gd name="connsiteX13" fmla="*/ 1212454 w 4243589"/>
+              <a:gd name="connsiteY13" fmla="*/ 18288 h 18288"/>
+              <a:gd name="connsiteX14" fmla="*/ 733535 w 4243589"/>
+              <a:gd name="connsiteY14" fmla="*/ 18288 h 18288"/>
+              <a:gd name="connsiteX15" fmla="*/ 0 w 4243589"/>
+              <a:gd name="connsiteY15" fmla="*/ 18288 h 18288"/>
+              <a:gd name="connsiteX16" fmla="*/ 0 w 4243589"/>
+              <a:gd name="connsiteY16" fmla="*/ 0 h 18288"/>
+            </a:gdLst>
+            <a:ahLst/>
+            <a:cxnLst>
+              <a:cxn ang="0">
+                <a:pos x="connsiteX0" y="connsiteY0"/>
+              </a:cxn>
+              <a:cxn ang="0">
+                <a:pos x="connsiteX1" y="connsiteY1"/>
+              </a:cxn>
+              <a:cxn ang="0">
+                <a:pos x="connsiteX2" y="connsiteY2"/>
+              </a:cxn>
+              <a:cxn ang="0">
+                <a:pos x="connsiteX3" y="connsiteY3"/>
+              </a:cxn>
+              <a:cxn ang="0">
+                <a:pos x="connsiteX4" y="connsiteY4"/>
+              </a:cxn>
+              <a:cxn ang="0">
+                <a:pos x="connsiteX5" y="connsiteY5"/>
+              </a:cxn>
+              <a:cxn ang="0">
+                <a:pos x="connsiteX6" y="connsiteY6"/>
+              </a:cxn>
+              <a:cxn ang="0">
+                <a:pos x="connsiteX7" y="connsiteY7"/>
+              </a:cxn>
+              <a:cxn ang="0">
+                <a:pos x="connsiteX8" y="connsiteY8"/>
+              </a:cxn>
+              <a:cxn ang="0">
+                <a:pos x="connsiteX9" y="connsiteY9"/>
+              </a:cxn>
+              <a:cxn ang="0">
+                <a:pos x="connsiteX10" y="connsiteY10"/>
+              </a:cxn>
+              <a:cxn ang="0">
+                <a:pos x="connsiteX11" y="connsiteY11"/>
+              </a:cxn>
+              <a:cxn ang="0">
+                <a:pos x="connsiteX12" y="connsiteY12"/>
+              </a:cxn>
+              <a:cxn ang="0">
+                <a:pos x="connsiteX13" y="connsiteY13"/>
+              </a:cxn>
+              <a:cxn ang="0">
+                <a:pos x="connsiteX14" y="connsiteY14"/>
+              </a:cxn>
+              <a:cxn ang="0">
+                <a:pos x="connsiteX15" y="connsiteY15"/>
+              </a:cxn>
+              <a:cxn ang="0">
+                <a:pos x="connsiteX16" y="connsiteY16"/>
+              </a:cxn>
+            </a:cxnLst>
+            <a:rect l="l" t="t" r="r" b="b"/>
+            <a:pathLst>
+              <a:path w="4243589" h="18288" fill="none" extrusionOk="0">
+                <a:moveTo>
+                  <a:pt x="0" y="0"/>
+                </a:moveTo>
+                <a:cubicBezTo>
+                  <a:pt x="213395" y="-21006"/>
+                  <a:pt x="307421" y="-18116"/>
+                  <a:pt x="478919" y="0"/>
+                </a:cubicBezTo>
+                <a:cubicBezTo>
+                  <a:pt x="650417" y="18116"/>
+                  <a:pt x="831092" y="-21237"/>
+                  <a:pt x="957839" y="0"/>
+                </a:cubicBezTo>
+                <a:cubicBezTo>
+                  <a:pt x="1084586" y="21237"/>
+                  <a:pt x="1301682" y="25124"/>
+                  <a:pt x="1521630" y="0"/>
+                </a:cubicBezTo>
+                <a:cubicBezTo>
+                  <a:pt x="1741578" y="-25124"/>
+                  <a:pt x="1970269" y="-29139"/>
+                  <a:pt x="2212729" y="0"/>
+                </a:cubicBezTo>
+                <a:cubicBezTo>
+                  <a:pt x="2455189" y="29139"/>
+                  <a:pt x="2558847" y="-4796"/>
+                  <a:pt x="2734084" y="0"/>
+                </a:cubicBezTo>
+                <a:cubicBezTo>
+                  <a:pt x="2909321" y="4796"/>
+                  <a:pt x="3097217" y="-13409"/>
+                  <a:pt x="3255439" y="0"/>
+                </a:cubicBezTo>
+                <a:cubicBezTo>
+                  <a:pt x="3413662" y="13409"/>
+                  <a:pt x="3979999" y="-10121"/>
+                  <a:pt x="4243589" y="0"/>
+                </a:cubicBezTo>
+                <a:cubicBezTo>
+                  <a:pt x="4244484" y="8974"/>
+                  <a:pt x="4243043" y="9359"/>
+                  <a:pt x="4243589" y="18288"/>
+                </a:cubicBezTo>
+                <a:cubicBezTo>
+                  <a:pt x="4058777" y="31246"/>
+                  <a:pt x="3910348" y="3158"/>
+                  <a:pt x="3594926" y="18288"/>
+                </a:cubicBezTo>
+                <a:cubicBezTo>
+                  <a:pt x="3279504" y="33418"/>
+                  <a:pt x="3319955" y="-3977"/>
+                  <a:pt x="3073571" y="18288"/>
+                </a:cubicBezTo>
+                <a:cubicBezTo>
+                  <a:pt x="2827187" y="40553"/>
+                  <a:pt x="2767387" y="1863"/>
+                  <a:pt x="2552216" y="18288"/>
+                </a:cubicBezTo>
+                <a:cubicBezTo>
+                  <a:pt x="2337046" y="34713"/>
+                  <a:pt x="2181871" y="19527"/>
+                  <a:pt x="1903553" y="18288"/>
+                </a:cubicBezTo>
+                <a:cubicBezTo>
+                  <a:pt x="1625235" y="17049"/>
+                  <a:pt x="1557672" y="24174"/>
+                  <a:pt x="1212454" y="18288"/>
+                </a:cubicBezTo>
+                <a:cubicBezTo>
+                  <a:pt x="867236" y="12402"/>
+                  <a:pt x="874382" y="15627"/>
+                  <a:pt x="733535" y="18288"/>
+                </a:cubicBezTo>
+                <a:cubicBezTo>
+                  <a:pt x="592688" y="20949"/>
+                  <a:pt x="183477" y="14753"/>
+                  <a:pt x="0" y="18288"/>
+                </a:cubicBezTo>
+                <a:cubicBezTo>
+                  <a:pt x="-229" y="14222"/>
+                  <a:pt x="509" y="5816"/>
+                  <a:pt x="0" y="0"/>
+                </a:cubicBezTo>
+                <a:close/>
+              </a:path>
+              <a:path w="4243589" h="18288" stroke="0" extrusionOk="0">
+                <a:moveTo>
+                  <a:pt x="0" y="0"/>
+                </a:moveTo>
+                <a:cubicBezTo>
+                  <a:pt x="143690" y="16630"/>
+                  <a:pt x="266667" y="14847"/>
+                  <a:pt x="521355" y="0"/>
+                </a:cubicBezTo>
+                <a:cubicBezTo>
+                  <a:pt x="776043" y="-14847"/>
+                  <a:pt x="814491" y="-17363"/>
+                  <a:pt x="1000275" y="0"/>
+                </a:cubicBezTo>
+                <a:cubicBezTo>
+                  <a:pt x="1186059" y="17363"/>
+                  <a:pt x="1352504" y="-23507"/>
+                  <a:pt x="1521630" y="0"/>
+                </a:cubicBezTo>
+                <a:cubicBezTo>
+                  <a:pt x="1690756" y="23507"/>
+                  <a:pt x="1889525" y="5871"/>
+                  <a:pt x="2127857" y="0"/>
+                </a:cubicBezTo>
+                <a:cubicBezTo>
+                  <a:pt x="2366189" y="-5871"/>
+                  <a:pt x="2620628" y="-27997"/>
+                  <a:pt x="2776520" y="0"/>
+                </a:cubicBezTo>
+                <a:cubicBezTo>
+                  <a:pt x="2932412" y="27997"/>
+                  <a:pt x="3131683" y="-25073"/>
+                  <a:pt x="3467618" y="0"/>
+                </a:cubicBezTo>
+                <a:cubicBezTo>
+                  <a:pt x="3803553" y="25073"/>
+                  <a:pt x="4017371" y="3071"/>
+                  <a:pt x="4243589" y="0"/>
+                </a:cubicBezTo>
+                <a:cubicBezTo>
+                  <a:pt x="4243134" y="6162"/>
+                  <a:pt x="4243492" y="11775"/>
+                  <a:pt x="4243589" y="18288"/>
+                </a:cubicBezTo>
+                <a:cubicBezTo>
+                  <a:pt x="4017834" y="-5779"/>
+                  <a:pt x="3834586" y="13376"/>
+                  <a:pt x="3594926" y="18288"/>
+                </a:cubicBezTo>
+                <a:cubicBezTo>
+                  <a:pt x="3355266" y="23200"/>
+                  <a:pt x="3204179" y="2869"/>
+                  <a:pt x="2903827" y="18288"/>
+                </a:cubicBezTo>
+                <a:cubicBezTo>
+                  <a:pt x="2603475" y="33707"/>
+                  <a:pt x="2526187" y="46187"/>
+                  <a:pt x="2212729" y="18288"/>
+                </a:cubicBezTo>
+                <a:cubicBezTo>
+                  <a:pt x="1899271" y="-9611"/>
+                  <a:pt x="1966289" y="29692"/>
+                  <a:pt x="1733809" y="18288"/>
+                </a:cubicBezTo>
+                <a:cubicBezTo>
+                  <a:pt x="1501329" y="6884"/>
+                  <a:pt x="1343612" y="12492"/>
+                  <a:pt x="1085146" y="18288"/>
+                </a:cubicBezTo>
+                <a:cubicBezTo>
+                  <a:pt x="826680" y="24084"/>
+                  <a:pt x="778184" y="35607"/>
+                  <a:pt x="521355" y="18288"/>
+                </a:cubicBezTo>
+                <a:cubicBezTo>
+                  <a:pt x="264526" y="969"/>
+                  <a:pt x="120277" y="4268"/>
+                  <a:pt x="0" y="18288"/>
+                </a:cubicBezTo>
+                <a:cubicBezTo>
+                  <a:pt x="766" y="10800"/>
+                  <a:pt x="-457" y="8180"/>
+                  <a:pt x="0" y="0"/>
+                </a:cubicBezTo>
+                <a:close/>
+              </a:path>
+            </a:pathLst>
+          </a:custGeom>
+          <a:solidFill>
+            <a:schemeClr val="accent2"/>
+          </a:solidFill>
+          <a:ln w="44450" cap="rnd">
+            <a:solidFill>
+              <a:schemeClr val="accent2"/>
+            </a:solidFill>
+            <a:round/>
+            <a:extLst>
+              <a:ext uri="{C807C97D-BFC1-408E-A445-0C87EB9F89A2}">
+                <ask:lineSketchStyleProps xmlns:ask="http://schemas.microsoft.com/office/drawing/2018/sketchyshapes" sd="2727557108">
+                  <a:prstGeom prst="rect">
+                    <a:avLst/>
+                  </a:prstGeom>
+                  <ask:type>
+                    <ask:lineSketchFreehand/>
+                  </ask:type>
+                </ask:lineSketchStyleProps>
+              </a:ext>
+            </a:extLst>
+          </a:ln>
+        </p:spPr>
+        <p:style>
+          <a:lnRef idx="2">
+            <a:schemeClr val="accent1">
+              <a:shade val="50000"/>
+            </a:schemeClr>
+          </a:lnRef>
+          <a:fillRef idx="1">
+            <a:schemeClr val="accent1"/>
+          </a:fillRef>
+          <a:effectRef idx="0">
+            <a:schemeClr val="accent1"/>
+          </a:effectRef>
+          <a:fontRef idx="minor">
+            <a:schemeClr val="lt1"/>
+          </a:fontRef>
+        </p:style>
+        <p:txBody>
+          <a:bodyPr rtlCol="0" anchor="ctr"/>
+          <a:lstStyle/>
+          <a:p>
+            <a:pPr algn="ctr"/>
+            <a:endParaRPr lang="en-US"/>
+          </a:p>
+        </p:txBody>
+      </p:sp>
+      <p:sp>
+        <p:nvSpPr>
+          <p:cNvPr id="3" name="מציין מיקום תוכן 2">
+            <a:extLst>
+              <a:ext uri="{FF2B5EF4-FFF2-40B4-BE49-F238E27FC236}">
+                <a16:creationId xmlns:a16="http://schemas.microsoft.com/office/drawing/2014/main" id="{EDA9085C-1461-E30C-9B9B-3EBF33767AA8}"/>
+              </a:ext>
+            </a:extLst>
+          </p:cNvPr>
+          <p:cNvSpPr>
+            <a:spLocks noGrp="1"/>
+          </p:cNvSpPr>
+          <p:nvPr>
+            <p:ph idx="1"/>
+          </p:nvPr>
+        </p:nvSpPr>
+        <p:spPr>
+          <a:xfrm>
+            <a:off x="5297762" y="2706624"/>
+            <a:ext cx="6251110" cy="3483864"/>
+          </a:xfrm>
+        </p:spPr>
+        <p:txBody>
+          <a:bodyPr>
+            <a:normAutofit/>
+          </a:bodyPr>
+          <a:lstStyle/>
+          <a:p>
+            <a:r>
+              <a:rPr lang="en-US" sz="2200" b="1" dirty="0">
+                <a:solidFill>
+                  <a:schemeClr val="bg1"/>
+                </a:solidFill>
+              </a:rPr>
+              <a:t>SPC</a:t>
+            </a:r>
+            <a:r>
+              <a:rPr lang="he-IL" sz="2200" b="1" dirty="0">
+                <a:solidFill>
+                  <a:schemeClr val="bg1"/>
+                </a:solidFill>
+              </a:rPr>
+              <a:t> – תרשימי בקרה למשתנים</a:t>
+            </a:r>
+            <a:r>
+              <a:rPr lang="he-IL" sz="2200" dirty="0">
+                <a:solidFill>
+                  <a:schemeClr val="bg1"/>
+                </a:solidFill>
+              </a:rPr>
+              <a:t>. שיטה זו כוללת שימוש בטכניקות סטטיסטיות, כגון בדיקת השערות, כדי לזהות מתי תהליך (מטרת התהליך היא לייצר הכנסות – ליצור מכירות) חרג מהביצועים הצפויים שלו. ניתן לזהות חנויות שהביצועים שלהן בעקביות גרועים מהביצועים הצפויים כמי שמבצעים ביצועים נמוכים יותר.</a:t>
+            </a:r>
+          </a:p>
+          <a:p>
+            <a:r>
+              <a:rPr lang="en-US" sz="2200" b="1" dirty="0">
+                <a:solidFill>
+                  <a:schemeClr val="bg1"/>
+                </a:solidFill>
+              </a:rPr>
+              <a:t>Clustering K – Means</a:t>
+            </a:r>
+            <a:r>
+              <a:rPr lang="he-IL" sz="2200" b="1" dirty="0">
+                <a:solidFill>
+                  <a:schemeClr val="bg1"/>
+                </a:solidFill>
+              </a:rPr>
+              <a:t> </a:t>
+            </a:r>
+            <a:r>
+              <a:rPr lang="he-IL" sz="2200" dirty="0">
+                <a:solidFill>
+                  <a:schemeClr val="bg1"/>
+                </a:solidFill>
+              </a:rPr>
+              <a:t>- ניתן להשתמש בנתוני המכירות כדי לזהות חנויות שמראות התנהגות חריגה בהשוואה למגמות המכירות הכוללות של החברה.</a:t>
+            </a:r>
+          </a:p>
+        </p:txBody>
+      </p:sp>
+    </p:spTree>
+    <p:extLst>
+      <p:ext uri="{BB962C8B-B14F-4D97-AF65-F5344CB8AC3E}">
+        <p14:creationId xmlns:p14="http://schemas.microsoft.com/office/powerpoint/2010/main" val="1487478954"/>
       </p:ext>
     </p:extLst>
   </p:cSld>

</xml_diff>

<commit_message>
made agenda for the project, upload yesterday's notebook
</commit_message>
<xml_diff>
--- a/ניטור סטטיסטי וזיהוי אנומליות - פרויקט - קבוצה 7.pptx
+++ b/ניטור סטטיסטי וזיהוי אנומליות - פרויקט - קבוצה 7.pptx
@@ -9,6 +9,9 @@
     <p:sldId id="257" r:id="rId3"/>
     <p:sldId id="258" r:id="rId4"/>
     <p:sldId id="259" r:id="rId5"/>
+    <p:sldId id="260" r:id="rId6"/>
+    <p:sldId id="262" r:id="rId7"/>
+    <p:sldId id="261" r:id="rId8"/>
   </p:sldIdLst>
   <p:sldSz cx="12192000" cy="6858000"/>
   <p:notesSz cx="6858000" cy="9144000"/>
@@ -262,7 +265,7 @@
           <a:p>
             <a:fld id="{A25EDE67-9873-4F92-ACA5-D54237536F1B}" type="datetimeFigureOut">
               <a:rPr lang="he-IL" smtClean="0"/>
-              <a:t>י"ט/טבת/תשפ"ג</a:t>
+              <a:t>כ"א/טבת/תשפ"ג</a:t>
             </a:fld>
             <a:endParaRPr lang="he-IL"/>
           </a:p>
@@ -460,7 +463,7 @@
           <a:p>
             <a:fld id="{A25EDE67-9873-4F92-ACA5-D54237536F1B}" type="datetimeFigureOut">
               <a:rPr lang="he-IL" smtClean="0"/>
-              <a:t>י"ט/טבת/תשפ"ג</a:t>
+              <a:t>כ"א/טבת/תשפ"ג</a:t>
             </a:fld>
             <a:endParaRPr lang="he-IL"/>
           </a:p>
@@ -668,7 +671,7 @@
           <a:p>
             <a:fld id="{A25EDE67-9873-4F92-ACA5-D54237536F1B}" type="datetimeFigureOut">
               <a:rPr lang="he-IL" smtClean="0"/>
-              <a:t>י"ט/טבת/תשפ"ג</a:t>
+              <a:t>כ"א/טבת/תשפ"ג</a:t>
             </a:fld>
             <a:endParaRPr lang="he-IL"/>
           </a:p>
@@ -866,7 +869,7 @@
           <a:p>
             <a:fld id="{A25EDE67-9873-4F92-ACA5-D54237536F1B}" type="datetimeFigureOut">
               <a:rPr lang="he-IL" smtClean="0"/>
-              <a:t>י"ט/טבת/תשפ"ג</a:t>
+              <a:t>כ"א/טבת/תשפ"ג</a:t>
             </a:fld>
             <a:endParaRPr lang="he-IL"/>
           </a:p>
@@ -1141,7 +1144,7 @@
           <a:p>
             <a:fld id="{A25EDE67-9873-4F92-ACA5-D54237536F1B}" type="datetimeFigureOut">
               <a:rPr lang="he-IL" smtClean="0"/>
-              <a:t>י"ט/טבת/תשפ"ג</a:t>
+              <a:t>כ"א/טבת/תשפ"ג</a:t>
             </a:fld>
             <a:endParaRPr lang="he-IL"/>
           </a:p>
@@ -1406,7 +1409,7 @@
           <a:p>
             <a:fld id="{A25EDE67-9873-4F92-ACA5-D54237536F1B}" type="datetimeFigureOut">
               <a:rPr lang="he-IL" smtClean="0"/>
-              <a:t>י"ט/טבת/תשפ"ג</a:t>
+              <a:t>כ"א/טבת/תשפ"ג</a:t>
             </a:fld>
             <a:endParaRPr lang="he-IL"/>
           </a:p>
@@ -1818,7 +1821,7 @@
           <a:p>
             <a:fld id="{A25EDE67-9873-4F92-ACA5-D54237536F1B}" type="datetimeFigureOut">
               <a:rPr lang="he-IL" smtClean="0"/>
-              <a:t>י"ט/טבת/תשפ"ג</a:t>
+              <a:t>כ"א/טבת/תשפ"ג</a:t>
             </a:fld>
             <a:endParaRPr lang="he-IL"/>
           </a:p>
@@ -1959,7 +1962,7 @@
           <a:p>
             <a:fld id="{A25EDE67-9873-4F92-ACA5-D54237536F1B}" type="datetimeFigureOut">
               <a:rPr lang="he-IL" smtClean="0"/>
-              <a:t>י"ט/טבת/תשפ"ג</a:t>
+              <a:t>כ"א/טבת/תשפ"ג</a:t>
             </a:fld>
             <a:endParaRPr lang="he-IL"/>
           </a:p>
@@ -2072,7 +2075,7 @@
           <a:p>
             <a:fld id="{A25EDE67-9873-4F92-ACA5-D54237536F1B}" type="datetimeFigureOut">
               <a:rPr lang="he-IL" smtClean="0"/>
-              <a:t>י"ט/טבת/תשפ"ג</a:t>
+              <a:t>כ"א/טבת/תשפ"ג</a:t>
             </a:fld>
             <a:endParaRPr lang="he-IL"/>
           </a:p>
@@ -2383,7 +2386,7 @@
           <a:p>
             <a:fld id="{A25EDE67-9873-4F92-ACA5-D54237536F1B}" type="datetimeFigureOut">
               <a:rPr lang="he-IL" smtClean="0"/>
-              <a:t>י"ט/טבת/תשפ"ג</a:t>
+              <a:t>כ"א/טבת/תשפ"ג</a:t>
             </a:fld>
             <a:endParaRPr lang="he-IL"/>
           </a:p>
@@ -2671,7 +2674,7 @@
           <a:p>
             <a:fld id="{A25EDE67-9873-4F92-ACA5-D54237536F1B}" type="datetimeFigureOut">
               <a:rPr lang="he-IL" smtClean="0"/>
-              <a:t>י"ט/טבת/תשפ"ג</a:t>
+              <a:t>כ"א/טבת/תשפ"ג</a:t>
             </a:fld>
             <a:endParaRPr lang="he-IL"/>
           </a:p>
@@ -2912,7 +2915,7 @@
           <a:p>
             <a:fld id="{A25EDE67-9873-4F92-ACA5-D54237536F1B}" type="datetimeFigureOut">
               <a:rPr lang="he-IL" smtClean="0"/>
-              <a:t>י"ט/טבת/תשפ"ג</a:t>
+              <a:t>כ"א/טבת/תשפ"ג</a:t>
             </a:fld>
             <a:endParaRPr lang="he-IL"/>
           </a:p>
@@ -5278,6 +5281,2093 @@
 </p:sld>
 </file>
 
+<file path=ppt/slides/slide5.xml><?xml version="1.0" encoding="utf-8"?>
+<p:sld xmlns:a="http://schemas.openxmlformats.org/drawingml/2006/main" xmlns:r="http://schemas.openxmlformats.org/officeDocument/2006/relationships" xmlns:p="http://schemas.openxmlformats.org/presentationml/2006/main">
+  <p:cSld>
+    <p:bg>
+      <p:bgPr>
+        <a:solidFill>
+          <a:schemeClr val="tx1"/>
+        </a:solidFill>
+        <a:effectLst/>
+      </p:bgPr>
+    </p:bg>
+    <p:spTree>
+      <p:nvGrpSpPr>
+        <p:cNvPr id="1" name=""/>
+        <p:cNvGrpSpPr/>
+        <p:nvPr/>
+      </p:nvGrpSpPr>
+      <p:grpSpPr>
+        <a:xfrm>
+          <a:off x="0" y="0"/>
+          <a:ext cx="0" cy="0"/>
+          <a:chOff x="0" y="0"/>
+          <a:chExt cx="0" cy="0"/>
+        </a:xfrm>
+      </p:grpSpPr>
+      <p:sp useBgFill="1">
+        <p:nvSpPr>
+          <p:cNvPr id="34" name="Rectangle 33">
+            <a:extLst>
+              <a:ext uri="{FF2B5EF4-FFF2-40B4-BE49-F238E27FC236}">
+                <a16:creationId xmlns:a16="http://schemas.microsoft.com/office/drawing/2014/main" id="{081EA652-8C6A-4E69-BEB9-170809474553}"/>
+              </a:ext>
+              <a:ext uri="{C183D7F6-B498-43B3-948B-1728B52AA6E4}">
+                <adec:decorative xmlns:adec="http://schemas.microsoft.com/office/drawing/2017/decorative" val="1"/>
+              </a:ext>
+            </a:extLst>
+          </p:cNvPr>
+          <p:cNvSpPr>
+            <a:spLocks noGrp="1" noRot="1" noChangeAspect="1" noMove="1" noResize="1" noEditPoints="1" noAdjustHandles="1" noChangeArrowheads="1" noChangeShapeType="1" noTextEdit="1"/>
+          </p:cNvSpPr>
+          <p:nvPr>
+            <p:extLst>
+              <p:ext uri="{386F3935-93C4-4BCD-93E2-E3B085C9AB24}">
+                <p16:designElem xmlns:p16="http://schemas.microsoft.com/office/powerpoint/2015/main" val="1"/>
+              </p:ext>
+            </p:extLst>
+          </p:nvPr>
+        </p:nvSpPr>
+        <p:spPr>
+          <a:xfrm>
+            <a:off x="0" y="0"/>
+            <a:ext cx="12192000" cy="6858000"/>
+          </a:xfrm>
+          <a:prstGeom prst="rect">
+            <a:avLst/>
+          </a:prstGeom>
+          <a:ln>
+            <a:noFill/>
+          </a:ln>
+        </p:spPr>
+        <p:style>
+          <a:lnRef idx="2">
+            <a:schemeClr val="accent1">
+              <a:shade val="50000"/>
+            </a:schemeClr>
+          </a:lnRef>
+          <a:fillRef idx="1">
+            <a:schemeClr val="accent1"/>
+          </a:fillRef>
+          <a:effectRef idx="0">
+            <a:schemeClr val="accent1"/>
+          </a:effectRef>
+          <a:fontRef idx="minor">
+            <a:schemeClr val="lt1"/>
+          </a:fontRef>
+        </p:style>
+        <p:txBody>
+          <a:bodyPr rtlCol="0" anchor="ctr"/>
+          <a:lstStyle/>
+          <a:p>
+            <a:pPr algn="ctr"/>
+            <a:endParaRPr lang="en-US"/>
+          </a:p>
+        </p:txBody>
+      </p:sp>
+      <p:sp>
+        <p:nvSpPr>
+          <p:cNvPr id="36" name="Right Triangle 35">
+            <a:extLst>
+              <a:ext uri="{FF2B5EF4-FFF2-40B4-BE49-F238E27FC236}">
+                <a16:creationId xmlns:a16="http://schemas.microsoft.com/office/drawing/2014/main" id="{5298780A-33B9-4EA2-8F67-DE68AD62841B}"/>
+              </a:ext>
+              <a:ext uri="{C183D7F6-B498-43B3-948B-1728B52AA6E4}">
+                <adec:decorative xmlns:adec="http://schemas.microsoft.com/office/drawing/2017/decorative" val="1"/>
+              </a:ext>
+            </a:extLst>
+          </p:cNvPr>
+          <p:cNvSpPr>
+            <a:spLocks noGrp="1" noRot="1" noChangeAspect="1" noMove="1" noResize="1" noEditPoints="1" noAdjustHandles="1" noChangeArrowheads="1" noChangeShapeType="1" noTextEdit="1"/>
+          </p:cNvSpPr>
+          <p:nvPr>
+            <p:extLst>
+              <p:ext uri="{386F3935-93C4-4BCD-93E2-E3B085C9AB24}">
+                <p16:designElem xmlns:p16="http://schemas.microsoft.com/office/powerpoint/2015/main" val="1"/>
+              </p:ext>
+            </p:extLst>
+          </p:nvPr>
+        </p:nvSpPr>
+        <p:spPr>
+          <a:xfrm flipH="1">
+            <a:off x="8576720" y="3335867"/>
+            <a:ext cx="3291840" cy="3200400"/>
+          </a:xfrm>
+          <a:prstGeom prst="rtTriangle">
+            <a:avLst/>
+          </a:prstGeom>
+          <a:solidFill>
+            <a:schemeClr val="accent4"/>
+          </a:solidFill>
+          <a:ln>
+            <a:noFill/>
+          </a:ln>
+        </p:spPr>
+        <p:style>
+          <a:lnRef idx="2">
+            <a:schemeClr val="accent1">
+              <a:shade val="50000"/>
+            </a:schemeClr>
+          </a:lnRef>
+          <a:fillRef idx="1">
+            <a:schemeClr val="accent1"/>
+          </a:fillRef>
+          <a:effectRef idx="0">
+            <a:schemeClr val="accent1"/>
+          </a:effectRef>
+          <a:fontRef idx="minor">
+            <a:schemeClr val="lt1"/>
+          </a:fontRef>
+        </p:style>
+        <p:txBody>
+          <a:bodyPr rtlCol="0" anchor="ctr"/>
+          <a:lstStyle/>
+          <a:p>
+            <a:pPr algn="ctr"/>
+            <a:endParaRPr lang="en-US" dirty="0"/>
+          </a:p>
+        </p:txBody>
+      </p:sp>
+      <p:sp>
+        <p:nvSpPr>
+          <p:cNvPr id="38" name="Rectangle 37">
+            <a:extLst>
+              <a:ext uri="{FF2B5EF4-FFF2-40B4-BE49-F238E27FC236}">
+                <a16:creationId xmlns:a16="http://schemas.microsoft.com/office/drawing/2014/main" id="{7F488E8B-4E1E-4402-8935-D4E6C02615C7}"/>
+              </a:ext>
+              <a:ext uri="{C183D7F6-B498-43B3-948B-1728B52AA6E4}">
+                <adec:decorative xmlns:adec="http://schemas.microsoft.com/office/drawing/2017/decorative" val="1"/>
+              </a:ext>
+            </a:extLst>
+          </p:cNvPr>
+          <p:cNvSpPr>
+            <a:spLocks noGrp="1" noRot="1" noChangeAspect="1" noMove="1" noResize="1" noEditPoints="1" noAdjustHandles="1" noChangeArrowheads="1" noChangeShapeType="1" noTextEdit="1"/>
+          </p:cNvSpPr>
+          <p:nvPr>
+            <p:extLst>
+              <p:ext uri="{386F3935-93C4-4BCD-93E2-E3B085C9AB24}">
+                <p16:designElem xmlns:p16="http://schemas.microsoft.com/office/powerpoint/2015/main" val="1"/>
+              </p:ext>
+            </p:extLst>
+          </p:nvPr>
+        </p:nvSpPr>
+        <p:spPr>
+          <a:xfrm>
+            <a:off x="641774" y="623275"/>
+            <a:ext cx="10905053" cy="5607882"/>
+          </a:xfrm>
+          <a:prstGeom prst="rect">
+            <a:avLst/>
+          </a:prstGeom>
+          <a:noFill/>
+          <a:ln w="19050">
+            <a:solidFill>
+              <a:schemeClr val="tx1">
+                <a:lumMod val="75000"/>
+                <a:lumOff val="25000"/>
+              </a:schemeClr>
+            </a:solidFill>
+          </a:ln>
+        </p:spPr>
+        <p:style>
+          <a:lnRef idx="2">
+            <a:schemeClr val="accent1">
+              <a:shade val="50000"/>
+            </a:schemeClr>
+          </a:lnRef>
+          <a:fillRef idx="1">
+            <a:schemeClr val="accent1"/>
+          </a:fillRef>
+          <a:effectRef idx="0">
+            <a:schemeClr val="accent1"/>
+          </a:effectRef>
+          <a:fontRef idx="minor">
+            <a:schemeClr val="lt1"/>
+          </a:fontRef>
+        </p:style>
+        <p:txBody>
+          <a:bodyPr rtlCol="0" anchor="ctr"/>
+          <a:lstStyle/>
+          <a:p>
+            <a:pPr algn="ctr"/>
+            <a:endParaRPr lang="en-US"/>
+          </a:p>
+        </p:txBody>
+      </p:sp>
+      <p:sp>
+        <p:nvSpPr>
+          <p:cNvPr id="2" name="כותרת 1">
+            <a:extLst>
+              <a:ext uri="{FF2B5EF4-FFF2-40B4-BE49-F238E27FC236}">
+                <a16:creationId xmlns:a16="http://schemas.microsoft.com/office/drawing/2014/main" id="{E14C55E2-9347-05A9-C2BA-4133406868BD}"/>
+              </a:ext>
+            </a:extLst>
+          </p:cNvPr>
+          <p:cNvSpPr>
+            <a:spLocks noGrp="1"/>
+          </p:cNvSpPr>
+          <p:nvPr>
+            <p:ph type="title"/>
+          </p:nvPr>
+        </p:nvSpPr>
+        <p:spPr>
+          <a:xfrm>
+            <a:off x="3472012" y="623275"/>
+            <a:ext cx="8074815" cy="991645"/>
+          </a:xfrm>
+        </p:spPr>
+        <p:txBody>
+          <a:bodyPr anchor="ctr">
+            <a:normAutofit/>
+          </a:bodyPr>
+          <a:lstStyle/>
+          <a:p>
+            <a:r>
+              <a:rPr lang="en-US" dirty="0">
+                <a:solidFill>
+                  <a:schemeClr val="bg1"/>
+                </a:solidFill>
+              </a:rPr>
+              <a:t>SPC</a:t>
+            </a:r>
+            <a:r>
+              <a:rPr lang="he-IL" dirty="0">
+                <a:solidFill>
+                  <a:schemeClr val="bg1"/>
+                </a:solidFill>
+              </a:rPr>
+              <a:t> - סיכום</a:t>
+            </a:r>
+          </a:p>
+        </p:txBody>
+      </p:sp>
+      <p:sp>
+        <p:nvSpPr>
+          <p:cNvPr id="3" name="מציין מיקום תוכן 2">
+            <a:extLst>
+              <a:ext uri="{FF2B5EF4-FFF2-40B4-BE49-F238E27FC236}">
+                <a16:creationId xmlns:a16="http://schemas.microsoft.com/office/drawing/2014/main" id="{A33A2AC0-3DBD-DE16-4EFA-445D841F5A88}"/>
+              </a:ext>
+            </a:extLst>
+          </p:cNvPr>
+          <p:cNvSpPr>
+            <a:spLocks noGrp="1"/>
+          </p:cNvSpPr>
+          <p:nvPr>
+            <p:ph idx="1"/>
+          </p:nvPr>
+        </p:nvSpPr>
+        <p:spPr>
+          <a:xfrm>
+            <a:off x="962527" y="1614921"/>
+            <a:ext cx="9160042" cy="4616236"/>
+          </a:xfrm>
+        </p:spPr>
+        <p:txBody>
+          <a:bodyPr anchor="t">
+            <a:normAutofit lnSpcReduction="10000"/>
+          </a:bodyPr>
+          <a:lstStyle/>
+          <a:p>
+            <a:r>
+              <a:rPr lang="he-IL" sz="2000" dirty="0">
+                <a:solidFill>
+                  <a:schemeClr val="bg1"/>
+                </a:solidFill>
+              </a:rPr>
+              <a:t>לא מדברים על תקינות של מוצר, אלא תקינות של תהליך.</a:t>
+            </a:r>
+          </a:p>
+          <a:p>
+            <a:r>
+              <a:rPr lang="he-IL" sz="2000" dirty="0">
+                <a:solidFill>
+                  <a:schemeClr val="bg1"/>
+                </a:solidFill>
+              </a:rPr>
+              <a:t>העיקרון: ביצוע מעקב אחר התנהגות סטטיסטי מסוים בין גבולות בקרה.</a:t>
+            </a:r>
+          </a:p>
+          <a:p>
+            <a:pPr lvl="1"/>
+            <a:r>
+              <a:rPr lang="he-IL" sz="2000" dirty="0">
+                <a:solidFill>
+                  <a:schemeClr val="bg1"/>
+                </a:solidFill>
+              </a:rPr>
+              <a:t>יש לבנות גבול עליון וגבול תחתון כאלה, כך שאם המערכת יציבה, ההסתברות שהתוצאה (סטטיסטי) המחושבת מהמדגם תחרוג מהגבולות הללו, היא קטנה מאוד.</a:t>
+            </a:r>
+          </a:p>
+          <a:p>
+            <a:pPr lvl="1"/>
+            <a:r>
+              <a:rPr lang="he-IL" sz="2000" dirty="0">
+                <a:solidFill>
+                  <a:schemeClr val="bg1"/>
+                </a:solidFill>
+              </a:rPr>
+              <a:t>במקרה שלנו: אנחנו מחשבים על המכירות שיצאו לנו מהמדגם.</a:t>
+            </a:r>
+          </a:p>
+          <a:p>
+            <a:pPr lvl="1"/>
+            <a:r>
+              <a:rPr lang="he-IL" sz="2000" dirty="0">
+                <a:solidFill>
+                  <a:schemeClr val="bg1"/>
+                </a:solidFill>
+              </a:rPr>
+              <a:t>נבנה גבולות בקרה כדי לצפות תזוזה של תהליך באופן מהיר יותר (מי לא ימכור מספיק), מעקב לאורך זמן.</a:t>
+            </a:r>
+          </a:p>
+          <a:p>
+            <a:r>
+              <a:rPr lang="he-IL" sz="2000" dirty="0">
+                <a:solidFill>
+                  <a:schemeClr val="bg1"/>
+                </a:solidFill>
+              </a:rPr>
+              <a:t>בתרשים: כל נקודה מייצגת מדגם בגודל </a:t>
+            </a:r>
+            <a:r>
+              <a:rPr lang="en-US" sz="2000" dirty="0">
+                <a:solidFill>
+                  <a:schemeClr val="bg1"/>
+                </a:solidFill>
+              </a:rPr>
+              <a:t>n</a:t>
+            </a:r>
+            <a:r>
+              <a:rPr lang="he-IL" sz="2000" dirty="0">
+                <a:solidFill>
+                  <a:schemeClr val="bg1"/>
+                </a:solidFill>
+              </a:rPr>
+              <a:t> מתוך מנה שלמה. הציר האופקי הוא ציר הזמן, והאנכי הוא ציר המשתנה/תכונה הרלוונטי.</a:t>
+            </a:r>
+          </a:p>
+          <a:p>
+            <a:r>
+              <a:rPr lang="he-IL" sz="2000" dirty="0">
+                <a:solidFill>
+                  <a:schemeClr val="bg1"/>
+                </a:solidFill>
+              </a:rPr>
+              <a:t>אם נקודה מסוימת (=ממוצע של מנה) נופלת מחוץ לגבולות הבקרה – כנראה שיש בעיה בתהליך ויש לבדוק את מקורו. אם יש התנהגות </a:t>
+            </a:r>
+            <a:r>
+              <a:rPr lang="he-IL" sz="2000" dirty="0" err="1">
+                <a:solidFill>
+                  <a:schemeClr val="bg1"/>
+                </a:solidFill>
+              </a:rPr>
+              <a:t>ססטימטית</a:t>
+            </a:r>
+            <a:r>
+              <a:rPr lang="he-IL" sz="2000" dirty="0">
+                <a:solidFill>
+                  <a:schemeClr val="bg1"/>
+                </a:solidFill>
+              </a:rPr>
+              <a:t> – צריך לבדוק. עולם של בדיקת השערות.</a:t>
+            </a:r>
+          </a:p>
+          <a:p>
+            <a:r>
+              <a:rPr lang="he-IL" sz="2000" dirty="0">
+                <a:solidFill>
+                  <a:schemeClr val="bg1"/>
+                </a:solidFill>
+              </a:rPr>
+              <a:t>נרצה למצוא את עוצמת המבחן להשוואה לשיטה </a:t>
+            </a:r>
+            <a:r>
+              <a:rPr lang="he-IL" sz="2000" dirty="0" err="1">
+                <a:solidFill>
+                  <a:schemeClr val="bg1"/>
+                </a:solidFill>
+              </a:rPr>
+              <a:t>השניה</a:t>
+            </a:r>
+            <a:r>
+              <a:rPr lang="he-IL" sz="2000" dirty="0">
+                <a:solidFill>
+                  <a:schemeClr val="bg1"/>
+                </a:solidFill>
+              </a:rPr>
+              <a:t>.</a:t>
+            </a:r>
+          </a:p>
+          <a:p>
+            <a:r>
+              <a:rPr lang="he-IL" sz="2000" dirty="0">
+                <a:solidFill>
+                  <a:schemeClr val="bg1"/>
+                </a:solidFill>
+              </a:rPr>
+              <a:t>נעשה תרשים בקרה לממוצע או לסטיית תקן?</a:t>
+            </a:r>
+          </a:p>
+        </p:txBody>
+      </p:sp>
+    </p:spTree>
+    <p:extLst>
+      <p:ext uri="{BB962C8B-B14F-4D97-AF65-F5344CB8AC3E}">
+        <p14:creationId xmlns:p14="http://schemas.microsoft.com/office/powerpoint/2010/main" val="87184166"/>
+      </p:ext>
+    </p:extLst>
+  </p:cSld>
+  <p:clrMapOvr>
+    <a:masterClrMapping/>
+  </p:clrMapOvr>
+</p:sld>
+</file>
+
+<file path=ppt/slides/slide6.xml><?xml version="1.0" encoding="utf-8"?>
+<p:sld xmlns:a="http://schemas.openxmlformats.org/drawingml/2006/main" xmlns:r="http://schemas.openxmlformats.org/officeDocument/2006/relationships" xmlns:p="http://schemas.openxmlformats.org/presentationml/2006/main">
+  <p:cSld>
+    <p:bg>
+      <p:bgPr>
+        <a:solidFill>
+          <a:schemeClr val="tx1"/>
+        </a:solidFill>
+        <a:effectLst/>
+      </p:bgPr>
+    </p:bg>
+    <p:spTree>
+      <p:nvGrpSpPr>
+        <p:cNvPr id="1" name=""/>
+        <p:cNvGrpSpPr/>
+        <p:nvPr/>
+      </p:nvGrpSpPr>
+      <p:grpSpPr>
+        <a:xfrm>
+          <a:off x="0" y="0"/>
+          <a:ext cx="0" cy="0"/>
+          <a:chOff x="0" y="0"/>
+          <a:chExt cx="0" cy="0"/>
+        </a:xfrm>
+      </p:grpSpPr>
+      <p:sp useBgFill="1">
+        <p:nvSpPr>
+          <p:cNvPr id="1032" name="Rectangle 1031">
+            <a:extLst>
+              <a:ext uri="{FF2B5EF4-FFF2-40B4-BE49-F238E27FC236}">
+                <a16:creationId xmlns:a16="http://schemas.microsoft.com/office/drawing/2014/main" id="{D009D6D5-DAC2-4A8B-A17A-E206B9012D09}"/>
+              </a:ext>
+              <a:ext uri="{C183D7F6-B498-43B3-948B-1728B52AA6E4}">
+                <adec:decorative xmlns:adec="http://schemas.microsoft.com/office/drawing/2017/decorative" val="1"/>
+              </a:ext>
+            </a:extLst>
+          </p:cNvPr>
+          <p:cNvSpPr>
+            <a:spLocks noGrp="1" noRot="1" noChangeAspect="1" noMove="1" noResize="1" noEditPoints="1" noAdjustHandles="1" noChangeArrowheads="1" noChangeShapeType="1" noTextEdit="1"/>
+          </p:cNvSpPr>
+          <p:nvPr>
+            <p:extLst>
+              <p:ext uri="{386F3935-93C4-4BCD-93E2-E3B085C9AB24}">
+                <p16:designElem xmlns:p16="http://schemas.microsoft.com/office/powerpoint/2015/main" val="1"/>
+              </p:ext>
+            </p:extLst>
+          </p:nvPr>
+        </p:nvSpPr>
+        <p:spPr>
+          <a:xfrm>
+            <a:off x="0" y="0"/>
+            <a:ext cx="12188952" cy="6858000"/>
+          </a:xfrm>
+          <a:prstGeom prst="rect">
+            <a:avLst/>
+          </a:prstGeom>
+          <a:ln>
+            <a:noFill/>
+          </a:ln>
+        </p:spPr>
+        <p:style>
+          <a:lnRef idx="2">
+            <a:schemeClr val="accent1">
+              <a:shade val="50000"/>
+            </a:schemeClr>
+          </a:lnRef>
+          <a:fillRef idx="1">
+            <a:schemeClr val="accent1"/>
+          </a:fillRef>
+          <a:effectRef idx="0">
+            <a:schemeClr val="accent1"/>
+          </a:effectRef>
+          <a:fontRef idx="minor">
+            <a:schemeClr val="lt1"/>
+          </a:fontRef>
+        </p:style>
+        <p:txBody>
+          <a:bodyPr rtlCol="0" anchor="ctr"/>
+          <a:lstStyle/>
+          <a:p>
+            <a:pPr algn="ctr"/>
+            <a:endParaRPr lang="en-US"/>
+          </a:p>
+        </p:txBody>
+      </p:sp>
+      <p:sp>
+        <p:nvSpPr>
+          <p:cNvPr id="2" name="כותרת 1">
+            <a:extLst>
+              <a:ext uri="{FF2B5EF4-FFF2-40B4-BE49-F238E27FC236}">
+                <a16:creationId xmlns:a16="http://schemas.microsoft.com/office/drawing/2014/main" id="{407F0085-5FE7-8ADC-2211-A94F4818A6D2}"/>
+              </a:ext>
+            </a:extLst>
+          </p:cNvPr>
+          <p:cNvSpPr>
+            <a:spLocks noGrp="1"/>
+          </p:cNvSpPr>
+          <p:nvPr>
+            <p:ph type="title"/>
+          </p:nvPr>
+        </p:nvSpPr>
+        <p:spPr>
+          <a:xfrm>
+            <a:off x="126732" y="365125"/>
+            <a:ext cx="5962785" cy="1807305"/>
+          </a:xfrm>
+        </p:spPr>
+        <p:txBody>
+          <a:bodyPr>
+            <a:normAutofit/>
+          </a:bodyPr>
+          <a:lstStyle/>
+          <a:p>
+            <a:r>
+              <a:rPr lang="en-US" dirty="0">
+                <a:solidFill>
+                  <a:schemeClr val="bg1"/>
+                </a:solidFill>
+              </a:rPr>
+              <a:t>SPC</a:t>
+            </a:r>
+            <a:r>
+              <a:rPr lang="he-IL" dirty="0">
+                <a:solidFill>
+                  <a:schemeClr val="bg1"/>
+                </a:solidFill>
+              </a:rPr>
+              <a:t> – </a:t>
+            </a:r>
+            <a:r>
+              <a:rPr lang="he-IL" dirty="0" err="1">
+                <a:solidFill>
+                  <a:schemeClr val="bg1"/>
+                </a:solidFill>
+              </a:rPr>
+              <a:t>ישום</a:t>
+            </a:r>
+            <a:r>
+              <a:rPr lang="he-IL" dirty="0">
+                <a:solidFill>
+                  <a:schemeClr val="bg1"/>
+                </a:solidFill>
+              </a:rPr>
+              <a:t> השיטה בפרויקט</a:t>
+            </a:r>
+          </a:p>
+        </p:txBody>
+      </p:sp>
+      <p:sp>
+        <p:nvSpPr>
+          <p:cNvPr id="3" name="מציין מיקום תוכן 2">
+            <a:extLst>
+              <a:ext uri="{FF2B5EF4-FFF2-40B4-BE49-F238E27FC236}">
+                <a16:creationId xmlns:a16="http://schemas.microsoft.com/office/drawing/2014/main" id="{289C9583-8B7A-E78E-120D-126FCBFF96B2}"/>
+              </a:ext>
+            </a:extLst>
+          </p:cNvPr>
+          <p:cNvSpPr>
+            <a:spLocks noGrp="1"/>
+          </p:cNvSpPr>
+          <p:nvPr>
+            <p:ph idx="1"/>
+          </p:nvPr>
+        </p:nvSpPr>
+        <p:spPr>
+          <a:xfrm>
+            <a:off x="206506" y="2172430"/>
+            <a:ext cx="5756280" cy="4320445"/>
+          </a:xfrm>
+        </p:spPr>
+        <p:txBody>
+          <a:bodyPr>
+            <a:normAutofit/>
+          </a:bodyPr>
+          <a:lstStyle/>
+          <a:p>
+            <a:r>
+              <a:rPr lang="he-IL" sz="2000" dirty="0">
+                <a:solidFill>
+                  <a:schemeClr val="bg1"/>
+                </a:solidFill>
+              </a:rPr>
+              <a:t>נבדוק את התפלגות המכירות (נתאים – אשתמש במה שעשו שנה שעברה).</a:t>
+            </a:r>
+          </a:p>
+          <a:p>
+            <a:r>
+              <a:rPr lang="he-IL" sz="2000" dirty="0">
+                <a:solidFill>
+                  <a:schemeClr val="bg1"/>
+                </a:solidFill>
+              </a:rPr>
+              <a:t>נגריל את החנויות ואת המכירות שלהן כל פעם, כאשר גודל הדגימה הינו 100 חנויות (כדי שנקבל מידע מהימן). נשמור את זה ב-</a:t>
+            </a:r>
+            <a:r>
+              <a:rPr lang="en-US" sz="2000" dirty="0">
+                <a:solidFill>
+                  <a:schemeClr val="bg1"/>
+                </a:solidFill>
+              </a:rPr>
+              <a:t>DF</a:t>
+            </a:r>
+            <a:r>
+              <a:rPr lang="he-IL" sz="2000" dirty="0">
+                <a:solidFill>
+                  <a:schemeClr val="bg1"/>
+                </a:solidFill>
+              </a:rPr>
+              <a:t> עם חנות, מכירות.</a:t>
+            </a:r>
+          </a:p>
+          <a:p>
+            <a:r>
+              <a:rPr lang="he-IL" sz="2000" dirty="0">
+                <a:solidFill>
+                  <a:schemeClr val="bg1"/>
+                </a:solidFill>
+              </a:rPr>
+              <a:t>נבצע </a:t>
+            </a:r>
+            <a:r>
+              <a:rPr lang="en-US" sz="2000" dirty="0" err="1">
+                <a:solidFill>
+                  <a:schemeClr val="bg1"/>
+                </a:solidFill>
+              </a:rPr>
+              <a:t>groupby</a:t>
+            </a:r>
+            <a:r>
+              <a:rPr lang="he-IL" sz="2000" dirty="0">
+                <a:solidFill>
+                  <a:schemeClr val="bg1"/>
+                </a:solidFill>
+              </a:rPr>
+              <a:t> לפי חנויות ונחשב את הממוצע – נשמור ל-</a:t>
+            </a:r>
+            <a:r>
+              <a:rPr lang="en-US" sz="2000" dirty="0">
+                <a:solidFill>
+                  <a:schemeClr val="bg1"/>
+                </a:solidFill>
+              </a:rPr>
+              <a:t>DF</a:t>
+            </a:r>
+            <a:r>
+              <a:rPr lang="he-IL" sz="2000" dirty="0">
+                <a:solidFill>
+                  <a:schemeClr val="bg1"/>
+                </a:solidFill>
+              </a:rPr>
+              <a:t> חדש – מייצג את </a:t>
+            </a:r>
+            <a:r>
+              <a:rPr lang="en-US" sz="2000" dirty="0" err="1">
+                <a:solidFill>
+                  <a:schemeClr val="bg1"/>
+                </a:solidFill>
+              </a:rPr>
+              <a:t>x_bar</a:t>
+            </a:r>
+            <a:r>
+              <a:rPr lang="he-IL" sz="2000" dirty="0">
+                <a:solidFill>
+                  <a:schemeClr val="bg1"/>
+                </a:solidFill>
+              </a:rPr>
+              <a:t>.</a:t>
+            </a:r>
+          </a:p>
+          <a:p>
+            <a:r>
+              <a:rPr lang="he-IL" sz="2000" dirty="0">
+                <a:solidFill>
+                  <a:schemeClr val="bg1"/>
+                </a:solidFill>
+              </a:rPr>
+              <a:t>נוכל לחשב בנוסף את </a:t>
+            </a:r>
+            <a:r>
+              <a:rPr lang="en-US" sz="2000" dirty="0">
+                <a:solidFill>
+                  <a:schemeClr val="bg1"/>
+                </a:solidFill>
+              </a:rPr>
+              <a:t>R</a:t>
+            </a:r>
+            <a:r>
+              <a:rPr lang="he-IL" sz="2000" dirty="0">
+                <a:solidFill>
+                  <a:schemeClr val="bg1"/>
+                </a:solidFill>
+              </a:rPr>
+              <a:t> – נחשב את המקסימום ואת המינימום של ה-</a:t>
+            </a:r>
+            <a:r>
+              <a:rPr lang="en-US" sz="2000" dirty="0">
+                <a:solidFill>
+                  <a:schemeClr val="bg1"/>
+                </a:solidFill>
+              </a:rPr>
+              <a:t>DF</a:t>
+            </a:r>
+            <a:r>
+              <a:rPr lang="he-IL" sz="2000" dirty="0">
+                <a:solidFill>
+                  <a:schemeClr val="bg1"/>
+                </a:solidFill>
+              </a:rPr>
+              <a:t> הקודם (שתי נקודות למעלה), וניצור עמודה של </a:t>
+            </a:r>
+            <a:r>
+              <a:rPr lang="en-US" sz="2000" dirty="0">
+                <a:solidFill>
+                  <a:schemeClr val="bg1"/>
+                </a:solidFill>
+              </a:rPr>
+              <a:t>R</a:t>
+            </a:r>
+            <a:r>
+              <a:rPr lang="he-IL" sz="2000" dirty="0">
+                <a:solidFill>
+                  <a:schemeClr val="bg1"/>
+                </a:solidFill>
+              </a:rPr>
+              <a:t> שתחושב כך: </a:t>
+            </a:r>
+            <a:r>
+              <a:rPr lang="en-US" sz="2000" dirty="0" err="1">
+                <a:solidFill>
+                  <a:schemeClr val="bg1"/>
+                </a:solidFill>
+              </a:rPr>
+              <a:t>df_grouped</a:t>
+            </a:r>
+            <a:r>
+              <a:rPr lang="en-US" sz="2000" dirty="0">
+                <a:solidFill>
+                  <a:schemeClr val="bg1"/>
+                </a:solidFill>
+              </a:rPr>
+              <a:t>['R'] = </a:t>
+            </a:r>
+            <a:r>
+              <a:rPr lang="en-US" sz="2000" dirty="0" err="1">
+                <a:solidFill>
+                  <a:schemeClr val="bg1"/>
+                </a:solidFill>
+              </a:rPr>
+              <a:t>df_max</a:t>
+            </a:r>
+            <a:r>
+              <a:rPr lang="en-US" sz="2000" dirty="0">
+                <a:solidFill>
+                  <a:schemeClr val="bg1"/>
+                </a:solidFill>
+              </a:rPr>
+              <a:t>['data'] - </a:t>
+            </a:r>
+            <a:r>
+              <a:rPr lang="en-US" sz="2000" dirty="0" err="1">
+                <a:solidFill>
+                  <a:schemeClr val="bg1"/>
+                </a:solidFill>
+              </a:rPr>
+              <a:t>df_min</a:t>
+            </a:r>
+            <a:r>
+              <a:rPr lang="en-US" sz="2000" dirty="0">
+                <a:solidFill>
+                  <a:schemeClr val="bg1"/>
+                </a:solidFill>
+              </a:rPr>
+              <a:t>['data']</a:t>
+            </a:r>
+          </a:p>
+          <a:p>
+            <a:r>
+              <a:rPr lang="he-IL" sz="2000" dirty="0">
+                <a:solidFill>
+                  <a:schemeClr val="bg1"/>
+                </a:solidFill>
+              </a:rPr>
+              <a:t>נחשב את גבולות הבקרה.</a:t>
+            </a:r>
+          </a:p>
+          <a:p>
+            <a:r>
+              <a:rPr lang="he-IL" sz="2000" dirty="0">
+                <a:solidFill>
+                  <a:schemeClr val="bg1"/>
+                </a:solidFill>
+              </a:rPr>
+              <a:t>נבנה את תרשים הבקרה.</a:t>
+            </a:r>
+          </a:p>
+        </p:txBody>
+      </p:sp>
+      <p:pic>
+        <p:nvPicPr>
+          <p:cNvPr id="1027" name="Picture 3" descr="תמונה שמכילה טקסט&#10;&#10;התיאור נוצר באופן אוטומטי">
+            <a:extLst>
+              <a:ext uri="{FF2B5EF4-FFF2-40B4-BE49-F238E27FC236}">
+                <a16:creationId xmlns:a16="http://schemas.microsoft.com/office/drawing/2014/main" id="{0D924C4E-9E0B-7C8C-E07D-2ACBC0868054}"/>
+              </a:ext>
+            </a:extLst>
+          </p:cNvPr>
+          <p:cNvPicPr>
+            <a:picLocks noChangeAspect="1" noChangeArrowheads="1"/>
+          </p:cNvPicPr>
+          <p:nvPr/>
+        </p:nvPicPr>
+        <p:blipFill rotWithShape="1">
+          <a:blip r:embed="rId2">
+            <a:extLst>
+              <a:ext uri="{28A0092B-C50C-407E-A947-70E740481C1C}">
+                <a14:useLocalDpi xmlns:a14="http://schemas.microsoft.com/office/drawing/2010/main" val="0"/>
+              </a:ext>
+            </a:extLst>
+          </a:blip>
+          <a:srcRect l="21676" t="-879" r="20286" b="877"/>
+          <a:stretch/>
+        </p:blipFill>
+        <p:spPr bwMode="auto">
+          <a:xfrm>
+            <a:off x="6229215" y="10"/>
+            <a:ext cx="5962785" cy="6857990"/>
+          </a:xfrm>
+          <a:custGeom>
+            <a:avLst/>
+            <a:gdLst/>
+            <a:ahLst/>
+            <a:cxnLst/>
+            <a:rect l="l" t="t" r="r" b="b"/>
+            <a:pathLst>
+              <a:path w="5962785" h="6858000">
+                <a:moveTo>
+                  <a:pt x="1044839" y="0"/>
+                </a:moveTo>
+                <a:lnTo>
+                  <a:pt x="5962785" y="0"/>
+                </a:lnTo>
+                <a:lnTo>
+                  <a:pt x="5962785" y="6858000"/>
+                </a:lnTo>
+                <a:lnTo>
+                  <a:pt x="1469886" y="6858000"/>
+                </a:lnTo>
+                <a:lnTo>
+                  <a:pt x="1416006" y="6823984"/>
+                </a:lnTo>
+                <a:cubicBezTo>
+                  <a:pt x="1356767" y="6787940"/>
+                  <a:pt x="1296437" y="6755500"/>
+                  <a:pt x="1232473" y="6733873"/>
+                </a:cubicBezTo>
+                <a:cubicBezTo>
+                  <a:pt x="1145250" y="6705037"/>
+                  <a:pt x="1060933" y="6654575"/>
+                  <a:pt x="1075471" y="6503186"/>
+                </a:cubicBezTo>
+                <a:cubicBezTo>
+                  <a:pt x="1078378" y="6459932"/>
+                  <a:pt x="1055118" y="6427493"/>
+                  <a:pt x="1020229" y="6438306"/>
+                </a:cubicBezTo>
+                <a:cubicBezTo>
+                  <a:pt x="953358" y="6459932"/>
+                  <a:pt x="921375" y="6398656"/>
+                  <a:pt x="883579" y="6351798"/>
+                </a:cubicBezTo>
+                <a:cubicBezTo>
+                  <a:pt x="816707" y="6268895"/>
+                  <a:pt x="752743" y="6182387"/>
+                  <a:pt x="645167" y="6167969"/>
+                </a:cubicBezTo>
+                <a:cubicBezTo>
+                  <a:pt x="665519" y="6103088"/>
+                  <a:pt x="700408" y="6110298"/>
+                  <a:pt x="732391" y="6124716"/>
+                </a:cubicBezTo>
+                <a:cubicBezTo>
+                  <a:pt x="816707" y="6160761"/>
+                  <a:pt x="901023" y="6200410"/>
+                  <a:pt x="985339" y="6236455"/>
+                </a:cubicBezTo>
+                <a:cubicBezTo>
+                  <a:pt x="1040581" y="6258081"/>
+                  <a:pt x="1095822" y="6290522"/>
+                  <a:pt x="1168509" y="6265291"/>
+                </a:cubicBezTo>
+                <a:cubicBezTo>
+                  <a:pt x="1104545" y="6135530"/>
+                  <a:pt x="996969" y="6110298"/>
+                  <a:pt x="909746" y="6070649"/>
+                </a:cubicBezTo>
+                <a:cubicBezTo>
+                  <a:pt x="802169" y="6020185"/>
+                  <a:pt x="738206" y="5926470"/>
+                  <a:pt x="659704" y="5818335"/>
+                </a:cubicBezTo>
+                <a:cubicBezTo>
+                  <a:pt x="738206" y="5789500"/>
+                  <a:pt x="787632" y="5868798"/>
+                  <a:pt x="851597" y="5865193"/>
+                </a:cubicBezTo>
+                <a:cubicBezTo>
+                  <a:pt x="854504" y="5854380"/>
+                  <a:pt x="860319" y="5832753"/>
+                  <a:pt x="860319" y="5832753"/>
+                </a:cubicBezTo>
+                <a:cubicBezTo>
+                  <a:pt x="755650" y="5775081"/>
+                  <a:pt x="709132" y="5666947"/>
+                  <a:pt x="691686" y="5533581"/>
+                </a:cubicBezTo>
+                <a:cubicBezTo>
+                  <a:pt x="685872" y="5465095"/>
+                  <a:pt x="648075" y="5443468"/>
+                  <a:pt x="610278" y="5411029"/>
+                </a:cubicBezTo>
+                <a:cubicBezTo>
+                  <a:pt x="482350" y="5299289"/>
+                  <a:pt x="345700" y="5198364"/>
+                  <a:pt x="238123" y="5046976"/>
+                </a:cubicBezTo>
+                <a:cubicBezTo>
+                  <a:pt x="363144" y="5064998"/>
+                  <a:pt x="461997" y="5165924"/>
+                  <a:pt x="592833" y="5209177"/>
+                </a:cubicBezTo>
+                <a:cubicBezTo>
+                  <a:pt x="488165" y="5043371"/>
+                  <a:pt x="351514" y="4956864"/>
+                  <a:pt x="226494" y="4855939"/>
+                </a:cubicBezTo>
+                <a:cubicBezTo>
+                  <a:pt x="168344" y="4809081"/>
+                  <a:pt x="116011" y="4751408"/>
+                  <a:pt x="49139" y="4726177"/>
+                </a:cubicBezTo>
+                <a:cubicBezTo>
+                  <a:pt x="25879" y="4718968"/>
+                  <a:pt x="-14825" y="4700947"/>
+                  <a:pt x="5527" y="4650483"/>
+                </a:cubicBezTo>
+                <a:cubicBezTo>
+                  <a:pt x="22972" y="4607230"/>
+                  <a:pt x="54954" y="4621648"/>
+                  <a:pt x="84029" y="4632460"/>
+                </a:cubicBezTo>
+                <a:cubicBezTo>
+                  <a:pt x="153807" y="4661296"/>
+                  <a:pt x="229401" y="4661296"/>
+                  <a:pt x="325347" y="4661296"/>
+                </a:cubicBezTo>
+                <a:cubicBezTo>
+                  <a:pt x="243939" y="4524326"/>
+                  <a:pt x="95658" y="4567580"/>
+                  <a:pt x="25879" y="4423401"/>
+                </a:cubicBezTo>
+                <a:cubicBezTo>
+                  <a:pt x="113103" y="4398170"/>
+                  <a:pt x="179975" y="4448632"/>
+                  <a:pt x="249753" y="4459446"/>
+                </a:cubicBezTo>
+                <a:cubicBezTo>
+                  <a:pt x="313718" y="4470259"/>
+                  <a:pt x="328254" y="4445028"/>
+                  <a:pt x="313718" y="4365729"/>
+                </a:cubicBezTo>
+                <a:cubicBezTo>
+                  <a:pt x="290458" y="4243177"/>
+                  <a:pt x="325347" y="4181900"/>
+                  <a:pt x="418386" y="4214341"/>
+                </a:cubicBezTo>
+                <a:cubicBezTo>
+                  <a:pt x="505609" y="4246781"/>
+                  <a:pt x="514332" y="4199922"/>
+                  <a:pt x="491072" y="4131438"/>
+                </a:cubicBezTo>
+                <a:cubicBezTo>
+                  <a:pt x="456183" y="4030512"/>
+                  <a:pt x="493979" y="3951214"/>
+                  <a:pt x="520147" y="3864706"/>
+                </a:cubicBezTo>
+                <a:cubicBezTo>
+                  <a:pt x="560851" y="3734945"/>
+                  <a:pt x="543407" y="3670064"/>
+                  <a:pt x="459090" y="3572743"/>
+                </a:cubicBezTo>
+                <a:cubicBezTo>
+                  <a:pt x="409664" y="3518676"/>
+                  <a:pt x="360236" y="3471818"/>
+                  <a:pt x="290458" y="3424959"/>
+                </a:cubicBezTo>
+                <a:cubicBezTo>
+                  <a:pt x="450368" y="3399728"/>
+                  <a:pt x="284643" y="3313221"/>
+                  <a:pt x="339884" y="3259153"/>
+                </a:cubicBezTo>
+                <a:cubicBezTo>
+                  <a:pt x="453275" y="3237527"/>
+                  <a:pt x="543407" y="3410542"/>
+                  <a:pt x="697501" y="3360078"/>
+                </a:cubicBezTo>
+                <a:cubicBezTo>
+                  <a:pt x="511425" y="3212294"/>
+                  <a:pt x="302087" y="3165436"/>
+                  <a:pt x="165437" y="2967190"/>
+                </a:cubicBezTo>
+                <a:cubicBezTo>
+                  <a:pt x="197419" y="2923937"/>
+                  <a:pt x="229401" y="2967190"/>
+                  <a:pt x="255568" y="2949167"/>
+                </a:cubicBezTo>
+                <a:cubicBezTo>
+                  <a:pt x="255568" y="2938354"/>
+                  <a:pt x="560851" y="3006840"/>
+                  <a:pt x="578296" y="2725691"/>
+                </a:cubicBezTo>
+                <a:cubicBezTo>
+                  <a:pt x="584111" y="2725691"/>
+                  <a:pt x="589926" y="2725691"/>
+                  <a:pt x="595740" y="2714876"/>
+                </a:cubicBezTo>
+                <a:cubicBezTo>
+                  <a:pt x="627722" y="2675228"/>
+                  <a:pt x="598648" y="2581510"/>
+                  <a:pt x="650982" y="2574301"/>
+                </a:cubicBezTo>
+                <a:cubicBezTo>
+                  <a:pt x="709132" y="2567092"/>
+                  <a:pt x="764373" y="2534653"/>
+                  <a:pt x="825429" y="2552674"/>
+                </a:cubicBezTo>
+                <a:cubicBezTo>
+                  <a:pt x="871949" y="2567092"/>
+                  <a:pt x="921375" y="2585115"/>
+                  <a:pt x="970802" y="2585115"/>
+                </a:cubicBezTo>
+                <a:cubicBezTo>
+                  <a:pt x="1023136" y="2585115"/>
+                  <a:pt x="1095822" y="2707668"/>
+                  <a:pt x="1127805" y="2545465"/>
+                </a:cubicBezTo>
+                <a:cubicBezTo>
+                  <a:pt x="1127805" y="2538257"/>
+                  <a:pt x="1217936" y="2556280"/>
+                  <a:pt x="1267362" y="2563488"/>
+                </a:cubicBezTo>
+                <a:cubicBezTo>
+                  <a:pt x="1308067" y="2570698"/>
+                  <a:pt x="1357494" y="2603137"/>
+                  <a:pt x="1386568" y="2538257"/>
+                </a:cubicBezTo>
+                <a:cubicBezTo>
+                  <a:pt x="1401105" y="2498607"/>
+                  <a:pt x="1331326" y="2426518"/>
+                  <a:pt x="1270270" y="2419309"/>
+                </a:cubicBezTo>
+                <a:cubicBezTo>
+                  <a:pt x="1215029" y="2412101"/>
+                  <a:pt x="1159787" y="2404892"/>
+                  <a:pt x="1107453" y="2419309"/>
+                </a:cubicBezTo>
+                <a:cubicBezTo>
+                  <a:pt x="1043489" y="2437331"/>
+                  <a:pt x="1008599" y="2408495"/>
+                  <a:pt x="991154" y="2343615"/>
+                </a:cubicBezTo>
+                <a:cubicBezTo>
+                  <a:pt x="970802" y="2275131"/>
+                  <a:pt x="933005" y="2239085"/>
+                  <a:pt x="880671" y="2206645"/>
+                </a:cubicBezTo>
+                <a:cubicBezTo>
+                  <a:pt x="752743" y="2127346"/>
+                  <a:pt x="630630" y="2033629"/>
+                  <a:pt x="491072" y="1986771"/>
+                </a:cubicBezTo>
+                <a:cubicBezTo>
+                  <a:pt x="464905" y="1979562"/>
+                  <a:pt x="432923" y="1965145"/>
+                  <a:pt x="421293" y="1903868"/>
+                </a:cubicBezTo>
+                <a:cubicBezTo>
+                  <a:pt x="799262" y="1997584"/>
+                  <a:pt x="1142342" y="2239085"/>
+                  <a:pt x="1531941" y="2224667"/>
+                </a:cubicBezTo>
+                <a:cubicBezTo>
+                  <a:pt x="1427272" y="2148974"/>
+                  <a:pt x="1302252" y="2145369"/>
+                  <a:pt x="1188861" y="2091301"/>
+                </a:cubicBezTo>
+                <a:cubicBezTo>
+                  <a:pt x="1270270" y="2051652"/>
+                  <a:pt x="1345864" y="2094906"/>
+                  <a:pt x="1421458" y="2116532"/>
+                </a:cubicBezTo>
+                <a:cubicBezTo>
+                  <a:pt x="1485422" y="2134554"/>
+                  <a:pt x="1543571" y="2138160"/>
+                  <a:pt x="1549386" y="2026420"/>
+                </a:cubicBezTo>
+                <a:cubicBezTo>
+                  <a:pt x="1549386" y="2015607"/>
+                  <a:pt x="1549386" y="2008398"/>
+                  <a:pt x="1549386" y="1997584"/>
+                </a:cubicBezTo>
+                <a:cubicBezTo>
+                  <a:pt x="1526126" y="1950727"/>
+                  <a:pt x="1494144" y="1929099"/>
+                  <a:pt x="1453440" y="1914682"/>
+                </a:cubicBezTo>
+                <a:cubicBezTo>
+                  <a:pt x="1430180" y="1907473"/>
+                  <a:pt x="1398198" y="1893056"/>
+                  <a:pt x="1398198" y="1860614"/>
+                </a:cubicBezTo>
+                <a:cubicBezTo>
+                  <a:pt x="1401105" y="1738063"/>
+                  <a:pt x="1322604" y="1702018"/>
+                  <a:pt x="1247011" y="1665972"/>
+                </a:cubicBezTo>
+                <a:cubicBezTo>
+                  <a:pt x="1287715" y="1604696"/>
+                  <a:pt x="1322604" y="1647950"/>
+                  <a:pt x="1354586" y="1644345"/>
+                </a:cubicBezTo>
+                <a:cubicBezTo>
+                  <a:pt x="1374939" y="1640741"/>
+                  <a:pt x="1395290" y="1637138"/>
+                  <a:pt x="1395290" y="1604696"/>
+                </a:cubicBezTo>
+                <a:cubicBezTo>
+                  <a:pt x="1395290" y="1579465"/>
+                  <a:pt x="1386568" y="1547025"/>
+                  <a:pt x="1366216" y="1547025"/>
+                </a:cubicBezTo>
+                <a:cubicBezTo>
+                  <a:pt x="1238288" y="1543420"/>
+                  <a:pt x="1165601" y="1370405"/>
+                  <a:pt x="1031858" y="1370405"/>
+                </a:cubicBezTo>
+                <a:cubicBezTo>
+                  <a:pt x="950450" y="1370405"/>
+                  <a:pt x="1072563" y="1273083"/>
+                  <a:pt x="1005692" y="1233435"/>
+                </a:cubicBezTo>
+                <a:cubicBezTo>
+                  <a:pt x="991154" y="1222621"/>
+                  <a:pt x="1046396" y="1208203"/>
+                  <a:pt x="1069655" y="1211808"/>
+                </a:cubicBezTo>
+                <a:cubicBezTo>
+                  <a:pt x="1092915" y="1215412"/>
+                  <a:pt x="1113268" y="1240644"/>
+                  <a:pt x="1142342" y="1222621"/>
+                </a:cubicBezTo>
+                <a:cubicBezTo>
+                  <a:pt x="1156879" y="1157741"/>
+                  <a:pt x="1119082" y="1132510"/>
+                  <a:pt x="1084193" y="1114487"/>
+                </a:cubicBezTo>
+                <a:cubicBezTo>
+                  <a:pt x="1008599" y="1071234"/>
+                  <a:pt x="933005" y="1020771"/>
+                  <a:pt x="848689" y="1006353"/>
+                </a:cubicBezTo>
+                <a:cubicBezTo>
+                  <a:pt x="819615" y="1002748"/>
+                  <a:pt x="802169" y="984726"/>
+                  <a:pt x="805077" y="948681"/>
+                </a:cubicBezTo>
+                <a:cubicBezTo>
+                  <a:pt x="810892" y="901822"/>
+                  <a:pt x="839967" y="916240"/>
+                  <a:pt x="863226" y="919844"/>
+                </a:cubicBezTo>
+                <a:cubicBezTo>
+                  <a:pt x="877764" y="923450"/>
+                  <a:pt x="892301" y="934263"/>
+                  <a:pt x="906838" y="909031"/>
+                </a:cubicBezTo>
+                <a:cubicBezTo>
+                  <a:pt x="566666" y="653113"/>
+                  <a:pt x="386404" y="667532"/>
+                  <a:pt x="5527" y="458471"/>
+                </a:cubicBezTo>
+                <a:cubicBezTo>
+                  <a:pt x="89843" y="418822"/>
+                  <a:pt x="150900" y="447658"/>
+                  <a:pt x="209049" y="454867"/>
+                </a:cubicBezTo>
+                <a:cubicBezTo>
+                  <a:pt x="354422" y="472890"/>
+                  <a:pt x="264290" y="505329"/>
+                  <a:pt x="409664" y="526956"/>
+                </a:cubicBezTo>
+                <a:cubicBezTo>
+                  <a:pt x="479443" y="537770"/>
+                  <a:pt x="543407" y="573815"/>
+                  <a:pt x="621908" y="516143"/>
+                </a:cubicBezTo>
+                <a:cubicBezTo>
+                  <a:pt x="674242" y="476494"/>
+                  <a:pt x="758558" y="519747"/>
+                  <a:pt x="822522" y="552188"/>
+                </a:cubicBezTo>
+                <a:cubicBezTo>
+                  <a:pt x="874856" y="581024"/>
+                  <a:pt x="927190" y="588232"/>
+                  <a:pt x="996969" y="552188"/>
+                </a:cubicBezTo>
+                <a:cubicBezTo>
+                  <a:pt x="933005" y="530562"/>
+                  <a:pt x="883579" y="512539"/>
+                  <a:pt x="834151" y="498120"/>
+                </a:cubicBezTo>
+                <a:cubicBezTo>
+                  <a:pt x="793447" y="487307"/>
+                  <a:pt x="770187" y="462076"/>
+                  <a:pt x="773095" y="408008"/>
+                </a:cubicBezTo>
+                <a:cubicBezTo>
+                  <a:pt x="773095" y="379172"/>
+                  <a:pt x="764373" y="339523"/>
+                  <a:pt x="793447" y="325106"/>
+                </a:cubicBezTo>
+                <a:cubicBezTo>
+                  <a:pt x="816707" y="310688"/>
+                  <a:pt x="848689" y="325106"/>
+                  <a:pt x="860319" y="350336"/>
+                </a:cubicBezTo>
+                <a:cubicBezTo>
+                  <a:pt x="874856" y="397195"/>
+                  <a:pt x="889393" y="440449"/>
+                  <a:pt x="938820" y="444054"/>
+                </a:cubicBezTo>
+                <a:cubicBezTo>
+                  <a:pt x="1005692" y="451262"/>
+                  <a:pt x="967894" y="422426"/>
+                  <a:pt x="956265" y="386381"/>
+                </a:cubicBezTo>
+                <a:cubicBezTo>
+                  <a:pt x="944635" y="346733"/>
+                  <a:pt x="979525" y="335919"/>
+                  <a:pt x="1002784" y="343127"/>
+                </a:cubicBezTo>
+                <a:cubicBezTo>
+                  <a:pt x="1090008" y="375569"/>
+                  <a:pt x="1180139" y="317897"/>
+                  <a:pt x="1270270" y="364755"/>
+                </a:cubicBezTo>
+                <a:cubicBezTo>
+                  <a:pt x="1247011" y="249411"/>
+                  <a:pt x="1197583" y="198949"/>
+                  <a:pt x="1092915" y="180926"/>
+                </a:cubicBezTo>
+                <a:cubicBezTo>
+                  <a:pt x="1055118" y="177322"/>
+                  <a:pt x="1014414" y="184530"/>
+                  <a:pt x="979525" y="152090"/>
+                </a:cubicBezTo>
+                <a:cubicBezTo>
+                  <a:pt x="959172" y="134068"/>
+                  <a:pt x="938820" y="112441"/>
+                  <a:pt x="953358" y="76396"/>
+                </a:cubicBezTo>
+                <a:cubicBezTo>
+                  <a:pt x="962080" y="51165"/>
+                  <a:pt x="985339" y="51165"/>
+                  <a:pt x="1005692" y="58373"/>
+                </a:cubicBezTo>
+                <a:cubicBezTo>
+                  <a:pt x="1090008" y="98023"/>
+                  <a:pt x="1180139" y="108837"/>
+                  <a:pt x="1267362" y="123254"/>
+                </a:cubicBezTo>
+                <a:cubicBezTo>
+                  <a:pt x="1281900" y="126859"/>
+                  <a:pt x="1296437" y="134068"/>
+                  <a:pt x="1310975" y="98023"/>
+                </a:cubicBezTo>
+                <a:cubicBezTo>
+                  <a:pt x="1260095" y="81803"/>
+                  <a:pt x="1209941" y="62879"/>
+                  <a:pt x="1159787" y="43505"/>
+                </a:cubicBezTo>
+                <a:close/>
+              </a:path>
+            </a:pathLst>
+          </a:custGeom>
+          <a:noFill/>
+          <a:extLst>
+            <a:ext uri="{909E8E84-426E-40DD-AFC4-6F175D3DCCD1}">
+              <a14:hiddenFill xmlns:a14="http://schemas.microsoft.com/office/drawing/2010/main">
+                <a:solidFill>
+                  <a:srgbClr val="FFFFFF"/>
+                </a:solidFill>
+              </a14:hiddenFill>
+            </a:ext>
+          </a:extLst>
+        </p:spPr>
+      </p:pic>
+    </p:spTree>
+    <p:extLst>
+      <p:ext uri="{BB962C8B-B14F-4D97-AF65-F5344CB8AC3E}">
+        <p14:creationId xmlns:p14="http://schemas.microsoft.com/office/powerpoint/2010/main" val="2359472916"/>
+      </p:ext>
+    </p:extLst>
+  </p:cSld>
+  <p:clrMapOvr>
+    <a:masterClrMapping/>
+  </p:clrMapOvr>
+</p:sld>
+</file>
+
+<file path=ppt/slides/slide7.xml><?xml version="1.0" encoding="utf-8"?>
+<p:sld xmlns:a="http://schemas.openxmlformats.org/drawingml/2006/main" xmlns:r="http://schemas.openxmlformats.org/officeDocument/2006/relationships" xmlns:p="http://schemas.openxmlformats.org/presentationml/2006/main">
+  <p:cSld>
+    <p:bg>
+      <p:bgPr>
+        <a:solidFill>
+          <a:schemeClr val="tx1"/>
+        </a:solidFill>
+        <a:effectLst/>
+      </p:bgPr>
+    </p:bg>
+    <p:spTree>
+      <p:nvGrpSpPr>
+        <p:cNvPr id="1" name=""/>
+        <p:cNvGrpSpPr/>
+        <p:nvPr/>
+      </p:nvGrpSpPr>
+      <p:grpSpPr>
+        <a:xfrm>
+          <a:off x="0" y="0"/>
+          <a:ext cx="0" cy="0"/>
+          <a:chOff x="0" y="0"/>
+          <a:chExt cx="0" cy="0"/>
+        </a:xfrm>
+      </p:grpSpPr>
+      <p:sp>
+        <p:nvSpPr>
+          <p:cNvPr id="2" name="כותרת 1">
+            <a:extLst>
+              <a:ext uri="{FF2B5EF4-FFF2-40B4-BE49-F238E27FC236}">
+                <a16:creationId xmlns:a16="http://schemas.microsoft.com/office/drawing/2014/main" id="{F58CB97D-522E-A16D-D075-7F08678486F8}"/>
+              </a:ext>
+            </a:extLst>
+          </p:cNvPr>
+          <p:cNvSpPr>
+            <a:spLocks noGrp="1"/>
+          </p:cNvSpPr>
+          <p:nvPr>
+            <p:ph type="title"/>
+          </p:nvPr>
+        </p:nvSpPr>
+        <p:spPr>
+          <a:xfrm>
+            <a:off x="4635591" y="629268"/>
+            <a:ext cx="7187441" cy="1286160"/>
+          </a:xfrm>
+        </p:spPr>
+        <p:txBody>
+          <a:bodyPr anchor="b">
+            <a:normAutofit/>
+          </a:bodyPr>
+          <a:lstStyle/>
+          <a:p>
+            <a:r>
+              <a:rPr lang="en-US" sz="4100" dirty="0">
+                <a:solidFill>
+                  <a:schemeClr val="bg1"/>
+                </a:solidFill>
+              </a:rPr>
+              <a:t>K Means Clustering</a:t>
+            </a:r>
+            <a:r>
+              <a:rPr lang="he-IL" sz="4100" dirty="0">
+                <a:solidFill>
+                  <a:schemeClr val="bg1"/>
+                </a:solidFill>
+              </a:rPr>
+              <a:t> – שיטה לזיהוי חריגים לא פרמטרית</a:t>
+            </a:r>
+          </a:p>
+        </p:txBody>
+      </p:sp>
+      <mc:AlternateContent xmlns:mc="http://schemas.openxmlformats.org/markup-compatibility/2006">
+        <mc:Choice xmlns:a14="http://schemas.microsoft.com/office/drawing/2010/main" Requires="a14">
+          <p:sp>
+            <p:nvSpPr>
+              <p:cNvPr id="3" name="מציין מיקום תוכן 2">
+                <a:extLst>
+                  <a:ext uri="{FF2B5EF4-FFF2-40B4-BE49-F238E27FC236}">
+                    <a16:creationId xmlns:a16="http://schemas.microsoft.com/office/drawing/2014/main" id="{76E83660-FD3B-9AB9-7504-43F0594AFE2E}"/>
+                  </a:ext>
+                </a:extLst>
+              </p:cNvPr>
+              <p:cNvSpPr>
+                <a:spLocks noGrp="1"/>
+              </p:cNvSpPr>
+              <p:nvPr>
+                <p:ph idx="1"/>
+              </p:nvPr>
+            </p:nvSpPr>
+            <p:spPr>
+              <a:xfrm>
+                <a:off x="4635591" y="2314807"/>
+                <a:ext cx="7187441" cy="4262453"/>
+              </a:xfrm>
+            </p:spPr>
+            <p:txBody>
+              <a:bodyPr>
+                <a:normAutofit/>
+              </a:bodyPr>
+              <a:lstStyle/>
+              <a:p>
+                <a:r>
+                  <a:rPr lang="he-IL" sz="1400" dirty="0">
+                    <a:solidFill>
+                      <a:schemeClr val="bg1"/>
+                    </a:solidFill>
+                  </a:rPr>
+                  <a:t>במקרה שלנו התפלגות הנתונים היא לא באמת ידועה, ואנחנו רק מנחשים, ולא באמת ניתן להניח שהרעש מתפלג נורמלית.</a:t>
+                </a:r>
+              </a:p>
+              <a:p>
+                <a:r>
+                  <a:rPr lang="he-IL" sz="1400" dirty="0">
+                    <a:solidFill>
+                      <a:schemeClr val="bg1"/>
+                    </a:solidFill>
+                  </a:rPr>
+                  <a:t>נשתמש בשיטה זו כי הוא מאפשר להתמודד עם כל סוגי התפלגויות.</a:t>
+                </a:r>
+              </a:p>
+              <a:p>
+                <a:r>
+                  <a:rPr lang="he-IL" sz="1400" dirty="0">
+                    <a:solidFill>
+                      <a:schemeClr val="bg1"/>
+                    </a:solidFill>
+                  </a:rPr>
+                  <a:t>נשתמש בכלל אצבע ונבחר מס' מרכזי הכובד להיות </a:t>
+                </a:r>
+                <a14:m>
+                  <m:oMath xmlns:m="http://schemas.openxmlformats.org/officeDocument/2006/math">
+                    <m:r>
+                      <a:rPr lang="en-US" sz="1400" b="0" i="1">
+                        <a:solidFill>
+                          <a:schemeClr val="bg1"/>
+                        </a:solidFill>
+                        <a:latin typeface="Cambria Math" panose="02040503050406030204" pitchFamily="18" charset="0"/>
+                      </a:rPr>
+                      <m:t>𝑘</m:t>
+                    </m:r>
+                    <m:r>
+                      <a:rPr lang="en-US" sz="1400" b="0" i="1">
+                        <a:solidFill>
+                          <a:schemeClr val="bg1"/>
+                        </a:solidFill>
+                        <a:latin typeface="Cambria Math" panose="02040503050406030204" pitchFamily="18" charset="0"/>
+                      </a:rPr>
+                      <m:t>=</m:t>
+                    </m:r>
+                    <m:rad>
+                      <m:radPr>
+                        <m:degHide m:val="on"/>
+                        <m:ctrlPr>
+                          <a:rPr lang="en-US" sz="1400" b="0" i="1">
+                            <a:solidFill>
+                              <a:schemeClr val="bg1"/>
+                            </a:solidFill>
+                            <a:latin typeface="Cambria Math" panose="02040503050406030204" pitchFamily="18" charset="0"/>
+                          </a:rPr>
+                        </m:ctrlPr>
+                      </m:radPr>
+                      <m:deg/>
+                      <m:e>
+                        <m:f>
+                          <m:fPr>
+                            <m:ctrlPr>
+                              <a:rPr lang="en-US" sz="1400" b="0" i="1">
+                                <a:solidFill>
+                                  <a:schemeClr val="bg1"/>
+                                </a:solidFill>
+                                <a:latin typeface="Cambria Math" panose="02040503050406030204" pitchFamily="18" charset="0"/>
+                              </a:rPr>
+                            </m:ctrlPr>
+                          </m:fPr>
+                          <m:num>
+                            <m:r>
+                              <a:rPr lang="en-US" sz="1400" b="0" i="1">
+                                <a:solidFill>
+                                  <a:schemeClr val="bg1"/>
+                                </a:solidFill>
+                                <a:latin typeface="Cambria Math" panose="02040503050406030204" pitchFamily="18" charset="0"/>
+                              </a:rPr>
+                              <m:t>𝑛</m:t>
+                            </m:r>
+                          </m:num>
+                          <m:den>
+                            <m:r>
+                              <a:rPr lang="en-US" sz="1400" b="0" i="1">
+                                <a:solidFill>
+                                  <a:schemeClr val="bg1"/>
+                                </a:solidFill>
+                                <a:latin typeface="Cambria Math" panose="02040503050406030204" pitchFamily="18" charset="0"/>
+                              </a:rPr>
+                              <m:t>2</m:t>
+                            </m:r>
+                          </m:den>
+                        </m:f>
+                      </m:e>
+                    </m:rad>
+                    <m:r>
+                      <a:rPr lang="en-US" sz="1400" b="0" i="1">
+                        <a:solidFill>
+                          <a:schemeClr val="bg1"/>
+                        </a:solidFill>
+                        <a:latin typeface="Cambria Math" panose="02040503050406030204" pitchFamily="18" charset="0"/>
+                      </a:rPr>
+                      <m:t>=</m:t>
+                    </m:r>
+                    <m:rad>
+                      <m:radPr>
+                        <m:degHide m:val="on"/>
+                        <m:ctrlPr>
+                          <a:rPr lang="en-US" sz="1400" b="0" i="1">
+                            <a:solidFill>
+                              <a:schemeClr val="bg1"/>
+                            </a:solidFill>
+                            <a:latin typeface="Cambria Math" panose="02040503050406030204" pitchFamily="18" charset="0"/>
+                          </a:rPr>
+                        </m:ctrlPr>
+                      </m:radPr>
+                      <m:deg/>
+                      <m:e/>
+                    </m:rad>
+                  </m:oMath>
+                </a14:m>
+                <a:endParaRPr lang="he-IL" sz="1400" b="0" dirty="0">
+                  <a:solidFill>
+                    <a:schemeClr val="bg1"/>
+                  </a:solidFill>
+                </a:endParaRPr>
+              </a:p>
+              <a:p>
+                <a:r>
+                  <a:rPr lang="he-IL" sz="1400" dirty="0">
+                    <a:solidFill>
+                      <a:schemeClr val="bg1"/>
+                    </a:solidFill>
+                  </a:rPr>
+                  <a:t>המטרה : בהינתן קבוצה של תצפיות </a:t>
+                </a:r>
+                <a14:m>
+                  <m:oMath xmlns:m="http://schemas.openxmlformats.org/officeDocument/2006/math">
+                    <m:sSub>
+                      <m:sSubPr>
+                        <m:ctrlPr>
+                          <a:rPr lang="en-US" sz="1400" i="1">
+                            <a:solidFill>
+                              <a:schemeClr val="bg1"/>
+                            </a:solidFill>
+                            <a:latin typeface="Cambria Math" panose="02040503050406030204" pitchFamily="18" charset="0"/>
+                          </a:rPr>
+                        </m:ctrlPr>
+                      </m:sSubPr>
+                      <m:e>
+                        <m:r>
+                          <a:rPr lang="en-US" sz="1400" i="1">
+                            <a:solidFill>
+                              <a:schemeClr val="bg1"/>
+                            </a:solidFill>
+                            <a:latin typeface="Cambria Math" panose="02040503050406030204" pitchFamily="18" charset="0"/>
+                          </a:rPr>
+                          <m:t>𝑥</m:t>
+                        </m:r>
+                      </m:e>
+                      <m:sub>
+                        <m:r>
+                          <a:rPr lang="en-US" sz="1400" i="1">
+                            <a:solidFill>
+                              <a:schemeClr val="bg1"/>
+                            </a:solidFill>
+                            <a:latin typeface="Cambria Math" panose="02040503050406030204" pitchFamily="18" charset="0"/>
+                          </a:rPr>
+                          <m:t>1</m:t>
+                        </m:r>
+                      </m:sub>
+                    </m:sSub>
+                    <m:r>
+                      <a:rPr lang="en-US" sz="1400" i="1">
+                        <a:solidFill>
+                          <a:schemeClr val="bg1"/>
+                        </a:solidFill>
+                        <a:latin typeface="Cambria Math" panose="02040503050406030204" pitchFamily="18" charset="0"/>
+                      </a:rPr>
+                      <m:t>,</m:t>
+                    </m:r>
+                    <m:sSub>
+                      <m:sSubPr>
+                        <m:ctrlPr>
+                          <a:rPr lang="en-US" sz="1400" i="1">
+                            <a:solidFill>
+                              <a:schemeClr val="bg1"/>
+                            </a:solidFill>
+                            <a:latin typeface="Cambria Math" panose="02040503050406030204" pitchFamily="18" charset="0"/>
+                          </a:rPr>
+                        </m:ctrlPr>
+                      </m:sSubPr>
+                      <m:e>
+                        <m:r>
+                          <a:rPr lang="en-US" sz="1400" i="1">
+                            <a:solidFill>
+                              <a:schemeClr val="bg1"/>
+                            </a:solidFill>
+                            <a:latin typeface="Cambria Math" panose="02040503050406030204" pitchFamily="18" charset="0"/>
+                          </a:rPr>
+                          <m:t>𝑥</m:t>
+                        </m:r>
+                      </m:e>
+                      <m:sub>
+                        <m:r>
+                          <a:rPr lang="en-US" sz="1400" i="1">
+                            <a:solidFill>
+                              <a:schemeClr val="bg1"/>
+                            </a:solidFill>
+                            <a:latin typeface="Cambria Math" panose="02040503050406030204" pitchFamily="18" charset="0"/>
+                          </a:rPr>
+                          <m:t>2</m:t>
+                        </m:r>
+                      </m:sub>
+                    </m:sSub>
+                    <m:r>
+                      <a:rPr lang="en-US" sz="1400" i="1">
+                        <a:solidFill>
+                          <a:schemeClr val="bg1"/>
+                        </a:solidFill>
+                        <a:latin typeface="Cambria Math" panose="02040503050406030204" pitchFamily="18" charset="0"/>
+                      </a:rPr>
+                      <m:t>, </m:t>
+                    </m:r>
+                    <m:sSub>
+                      <m:sSubPr>
+                        <m:ctrlPr>
+                          <a:rPr lang="en-US" sz="1400" i="1">
+                            <a:solidFill>
+                              <a:schemeClr val="bg1"/>
+                            </a:solidFill>
+                            <a:latin typeface="Cambria Math" panose="02040503050406030204" pitchFamily="18" charset="0"/>
+                          </a:rPr>
+                        </m:ctrlPr>
+                      </m:sSubPr>
+                      <m:e>
+                        <m:r>
+                          <a:rPr lang="en-US" sz="1400" i="1">
+                            <a:solidFill>
+                              <a:schemeClr val="bg1"/>
+                            </a:solidFill>
+                            <a:latin typeface="Cambria Math" panose="02040503050406030204" pitchFamily="18" charset="0"/>
+                          </a:rPr>
+                          <m:t>𝑥</m:t>
+                        </m:r>
+                      </m:e>
+                      <m:sub>
+                        <m:r>
+                          <a:rPr lang="en-US" sz="1400" i="1">
+                            <a:solidFill>
+                              <a:schemeClr val="bg1"/>
+                            </a:solidFill>
+                            <a:latin typeface="Cambria Math" panose="02040503050406030204" pitchFamily="18" charset="0"/>
+                          </a:rPr>
+                          <m:t>3</m:t>
+                        </m:r>
+                      </m:sub>
+                    </m:sSub>
+                    <m:r>
+                      <a:rPr lang="en-US" sz="1400" i="1">
+                        <a:solidFill>
+                          <a:schemeClr val="bg1"/>
+                        </a:solidFill>
+                        <a:latin typeface="Cambria Math" panose="02040503050406030204" pitchFamily="18" charset="0"/>
+                      </a:rPr>
+                      <m:t>, …,</m:t>
+                    </m:r>
+                    <m:sSub>
+                      <m:sSubPr>
+                        <m:ctrlPr>
+                          <a:rPr lang="en-US" sz="1400" i="1">
+                            <a:solidFill>
+                              <a:schemeClr val="bg1"/>
+                            </a:solidFill>
+                            <a:latin typeface="Cambria Math" panose="02040503050406030204" pitchFamily="18" charset="0"/>
+                          </a:rPr>
+                        </m:ctrlPr>
+                      </m:sSubPr>
+                      <m:e>
+                        <m:r>
+                          <a:rPr lang="en-US" sz="1400" i="1">
+                            <a:solidFill>
+                              <a:schemeClr val="bg1"/>
+                            </a:solidFill>
+                            <a:latin typeface="Cambria Math" panose="02040503050406030204" pitchFamily="18" charset="0"/>
+                          </a:rPr>
+                          <m:t>𝑥</m:t>
+                        </m:r>
+                      </m:e>
+                      <m:sub>
+                        <m:r>
+                          <a:rPr lang="en-US" sz="1400" i="1">
+                            <a:solidFill>
+                              <a:schemeClr val="bg1"/>
+                            </a:solidFill>
+                            <a:latin typeface="Cambria Math" panose="02040503050406030204" pitchFamily="18" charset="0"/>
+                          </a:rPr>
+                          <m:t>𝑛</m:t>
+                        </m:r>
+                      </m:sub>
+                    </m:sSub>
+                    <m:r>
+                      <a:rPr lang="en-US" sz="1400" i="1">
+                        <a:solidFill>
+                          <a:schemeClr val="bg1"/>
+                        </a:solidFill>
+                        <a:latin typeface="Cambria Math" panose="02040503050406030204" pitchFamily="18" charset="0"/>
+                      </a:rPr>
+                      <m:t> </m:t>
+                    </m:r>
+                  </m:oMath>
+                </a14:m>
+                <a:r>
+                  <a:rPr lang="he-IL" sz="1400" dirty="0">
+                    <a:solidFill>
+                      <a:schemeClr val="bg1"/>
+                    </a:solidFill>
+                  </a:rPr>
+                  <a:t> כאשר כל תצפית היא וקטור ממשי היכול להיות בעל מספר </a:t>
+                </a:r>
+                <a:r>
+                  <a:rPr lang="he-IL" sz="1400" dirty="0" err="1">
+                    <a:solidFill>
+                      <a:schemeClr val="bg1"/>
+                    </a:solidFill>
+                  </a:rPr>
+                  <a:t>מימדים</a:t>
+                </a:r>
+                <a:r>
+                  <a:rPr lang="he-IL" sz="1400" dirty="0">
+                    <a:solidFill>
+                      <a:schemeClr val="bg1"/>
+                    </a:solidFill>
+                  </a:rPr>
+                  <a:t> (כל </a:t>
+                </a:r>
+                <a:r>
+                  <a:rPr lang="he-IL" sz="1400" dirty="0" err="1">
+                    <a:solidFill>
+                      <a:schemeClr val="bg1"/>
+                    </a:solidFill>
+                  </a:rPr>
+                  <a:t>מימד</a:t>
+                </a:r>
+                <a:r>
+                  <a:rPr lang="he-IL" sz="1400" dirty="0">
+                    <a:solidFill>
+                      <a:schemeClr val="bg1"/>
+                    </a:solidFill>
+                  </a:rPr>
+                  <a:t> הינו תכונה אחרת), המודל שואף לחלק את כל</a:t>
+                </a:r>
+                <a:r>
+                  <a:rPr lang="en-US" sz="1400" dirty="0">
+                    <a:solidFill>
+                      <a:schemeClr val="bg1"/>
+                    </a:solidFill>
+                  </a:rPr>
+                  <a:t>n </a:t>
+                </a:r>
+                <a:r>
+                  <a:rPr lang="he-IL" sz="1400" dirty="0">
+                    <a:solidFill>
+                      <a:schemeClr val="bg1"/>
+                    </a:solidFill>
+                  </a:rPr>
+                  <a:t> התצפיות ל-</a:t>
+                </a:r>
+                <a:r>
+                  <a:rPr lang="en-US" sz="1400" dirty="0">
+                    <a:solidFill>
+                      <a:schemeClr val="bg1"/>
+                    </a:solidFill>
+                  </a:rPr>
+                  <a:t>k </a:t>
+                </a:r>
+                <a:r>
+                  <a:rPr lang="he-IL" sz="1400" dirty="0">
+                    <a:solidFill>
+                      <a:schemeClr val="bg1"/>
+                    </a:solidFill>
+                  </a:rPr>
+                  <a:t> אשכולות, תוך מזעור סכום המרחקים בין התצפיות בתוך האשכול.</a:t>
+                </a:r>
+              </a:p>
+              <a:p>
+                <a:r>
+                  <a:rPr lang="he-IL" sz="1400" dirty="0">
+                    <a:solidFill>
+                      <a:schemeClr val="bg1"/>
+                    </a:solidFill>
+                  </a:rPr>
+                  <a:t>שלבים: </a:t>
+                </a:r>
+              </a:p>
+              <a:p>
+                <a:pPr marL="971550" lvl="1" indent="-514350">
+                  <a:buFont typeface="+mj-lt"/>
+                  <a:buAutoNum type="arabicPeriod"/>
+                </a:pPr>
+                <a:r>
+                  <a:rPr lang="he-IL" sz="1400" dirty="0">
+                    <a:solidFill>
+                      <a:schemeClr val="bg1"/>
+                    </a:solidFill>
+                  </a:rPr>
+                  <a:t>קביעת </a:t>
+                </a:r>
+                <a:r>
+                  <a:rPr lang="en-US" sz="1400" dirty="0">
+                    <a:solidFill>
+                      <a:schemeClr val="bg1"/>
+                    </a:solidFill>
+                  </a:rPr>
+                  <a:t>K</a:t>
+                </a:r>
+                <a:r>
+                  <a:rPr lang="he-IL" sz="1400" dirty="0">
+                    <a:solidFill>
+                      <a:schemeClr val="bg1"/>
+                    </a:solidFill>
+                  </a:rPr>
+                  <a:t> מרכזים ראשוניים – רנדומלית.</a:t>
+                </a:r>
+              </a:p>
+              <a:p>
+                <a:pPr marL="971550" lvl="1" indent="-514350">
+                  <a:buFont typeface="+mj-lt"/>
+                  <a:buAutoNum type="arabicPeriod"/>
+                </a:pPr>
+                <a:r>
+                  <a:rPr lang="he-IL" sz="1400" dirty="0">
+                    <a:solidFill>
+                      <a:schemeClr val="bg1"/>
+                    </a:solidFill>
+                  </a:rPr>
+                  <a:t>שיוך נקודות למרכז הקרוב אליה.</a:t>
+                </a:r>
+              </a:p>
+              <a:p>
+                <a:pPr marL="971550" lvl="1" indent="-514350">
+                  <a:buFont typeface="+mj-lt"/>
+                  <a:buAutoNum type="arabicPeriod"/>
+                </a:pPr>
+                <a:r>
+                  <a:rPr lang="he-IL" sz="1400" dirty="0">
+                    <a:solidFill>
+                      <a:schemeClr val="bg1"/>
+                    </a:solidFill>
+                  </a:rPr>
+                  <a:t>חישוב מרכז כובד חדש.</a:t>
+                </a:r>
+              </a:p>
+              <a:p>
+                <a:pPr marL="971550" lvl="1" indent="-514350">
+                  <a:buFont typeface="+mj-lt"/>
+                  <a:buAutoNum type="arabicPeriod"/>
+                </a:pPr>
+                <a:r>
+                  <a:rPr lang="he-IL" sz="1400" dirty="0">
+                    <a:solidFill>
+                      <a:schemeClr val="bg1"/>
+                    </a:solidFill>
+                  </a:rPr>
+                  <a:t>נעצור אם לא יהיה שינוי במרכזי הכובד של כולם.</a:t>
+                </a:r>
+              </a:p>
+              <a:p>
+                <a:r>
+                  <a:rPr lang="he-IL" sz="1400" dirty="0">
+                    <a:solidFill>
+                      <a:schemeClr val="bg1"/>
+                    </a:solidFill>
+                  </a:rPr>
+                  <a:t>על מנת להשתמש באלגוריתם זה כדי למצוא אנומליות/מוצרים פגומים, נוכל לקבוע את מספר האשכולות שאנו מאמינים שיש (מספר המוצרים השונים), לבצע את האלגוריתם על מנת לשייך מוצר לאשכול שלו. לאחר מכן נחשב את המרחק של כל תצפית ממרכז האשכול אליו שויכה, במידה שהמרחק גדול מסף שקבענו, נגדיר תצפית/מוצר זה כחריג, אחרת, תצפית זאת תוגדר כתקינה.</a:t>
+                </a:r>
+              </a:p>
+            </p:txBody>
+          </p:sp>
+        </mc:Choice>
+        <mc:Fallback>
+          <p:sp>
+            <p:nvSpPr>
+              <p:cNvPr id="3" name="מציין מיקום תוכן 2">
+                <a:extLst>
+                  <a:ext uri="{FF2B5EF4-FFF2-40B4-BE49-F238E27FC236}">
+                    <a16:creationId xmlns:a16="http://schemas.microsoft.com/office/drawing/2014/main" id="{76E83660-FD3B-9AB9-7504-43F0594AFE2E}"/>
+                  </a:ext>
+                </a:extLst>
+              </p:cNvPr>
+              <p:cNvSpPr>
+                <a:spLocks noGrp="1" noRot="1" noChangeAspect="1" noMove="1" noResize="1" noEditPoints="1" noAdjustHandles="1" noChangeArrowheads="1" noChangeShapeType="1" noTextEdit="1"/>
+              </p:cNvSpPr>
+              <p:nvPr>
+                <p:ph idx="1"/>
+              </p:nvPr>
+            </p:nvSpPr>
+            <p:spPr>
+              <a:xfrm>
+                <a:off x="4635591" y="2314807"/>
+                <a:ext cx="7187441" cy="4262453"/>
+              </a:xfrm>
+              <a:blipFill>
+                <a:blip r:embed="rId2"/>
+                <a:stretch>
+                  <a:fillRect l="-339" t="-715" r="-254" b="-1288"/>
+                </a:stretch>
+              </a:blipFill>
+            </p:spPr>
+            <p:txBody>
+              <a:bodyPr/>
+              <a:lstStyle/>
+              <a:p>
+                <a:r>
+                  <a:rPr lang="he-IL">
+                    <a:noFill/>
+                  </a:rPr>
+                  <a:t> </a:t>
+                </a:r>
+              </a:p>
+            </p:txBody>
+          </p:sp>
+        </mc:Fallback>
+      </mc:AlternateContent>
+      <p:pic>
+        <p:nvPicPr>
+          <p:cNvPr id="5" name="Picture 4" descr="סימני שאלה רבים על רקע שחור">
+            <a:extLst>
+              <a:ext uri="{FF2B5EF4-FFF2-40B4-BE49-F238E27FC236}">
+                <a16:creationId xmlns:a16="http://schemas.microsoft.com/office/drawing/2014/main" id="{AFF57025-CF48-D80E-C3F4-D3F532315E24}"/>
+              </a:ext>
+            </a:extLst>
+          </p:cNvPr>
+          <p:cNvPicPr>
+            <a:picLocks noChangeAspect="1"/>
+          </p:cNvPicPr>
+          <p:nvPr/>
+        </p:nvPicPr>
+        <p:blipFill rotWithShape="1">
+          <a:blip r:embed="rId3"/>
+          <a:srcRect l="58767" r="2" b="2"/>
+          <a:stretch/>
+        </p:blipFill>
+        <p:spPr>
+          <a:xfrm>
+            <a:off x="20" y="10"/>
+            <a:ext cx="4635571" cy="6857990"/>
+          </a:xfrm>
+          <a:prstGeom prst="rect">
+            <a:avLst/>
+          </a:prstGeom>
+          <a:effectLst/>
+        </p:spPr>
+      </p:pic>
+      <p:cxnSp>
+        <p:nvCxnSpPr>
+          <p:cNvPr id="9" name="Straight Connector 8">
+            <a:extLst>
+              <a:ext uri="{FF2B5EF4-FFF2-40B4-BE49-F238E27FC236}">
+                <a16:creationId xmlns:a16="http://schemas.microsoft.com/office/drawing/2014/main" id="{A7F400EE-A8A5-48AF-B4D6-291B52C6F0B0}"/>
+              </a:ext>
+              <a:ext uri="{C183D7F6-B498-43B3-948B-1728B52AA6E4}">
+                <adec:decorative xmlns:adec="http://schemas.microsoft.com/office/drawing/2017/decorative" val="1"/>
+              </a:ext>
+            </a:extLst>
+          </p:cNvPr>
+          <p:cNvCxnSpPr>
+            <a:cxnSpLocks noGrp="1" noRot="1" noChangeAspect="1" noMove="1" noResize="1" noEditPoints="1" noAdjustHandles="1" noChangeArrowheads="1" noChangeShapeType="1"/>
+          </p:cNvCxnSpPr>
+          <p:nvPr>
+            <p:extLst>
+              <p:ext uri="{386F3935-93C4-4BCD-93E2-E3B085C9AB24}">
+                <p16:designElem xmlns:p16="http://schemas.microsoft.com/office/powerpoint/2015/main" val="1"/>
+              </p:ext>
+            </p:extLst>
+          </p:nvPr>
+        </p:nvCxnSpPr>
+        <p:spPr>
+          <a:xfrm>
+            <a:off x="5080934" y="2115117"/>
+            <a:ext cx="6309360" cy="0"/>
+          </a:xfrm>
+          <a:prstGeom prst="line">
+            <a:avLst/>
+          </a:prstGeom>
+          <a:ln w="19050">
+            <a:solidFill>
+              <a:schemeClr val="accent1"/>
+            </a:solidFill>
+          </a:ln>
+        </p:spPr>
+        <p:style>
+          <a:lnRef idx="1">
+            <a:schemeClr val="accent1"/>
+          </a:lnRef>
+          <a:fillRef idx="0">
+            <a:schemeClr val="accent1"/>
+          </a:fillRef>
+          <a:effectRef idx="0">
+            <a:schemeClr val="accent1"/>
+          </a:effectRef>
+          <a:fontRef idx="minor">
+            <a:schemeClr val="tx1"/>
+          </a:fontRef>
+        </p:style>
+      </p:cxnSp>
+    </p:spTree>
+    <p:extLst>
+      <p:ext uri="{BB962C8B-B14F-4D97-AF65-F5344CB8AC3E}">
+        <p14:creationId xmlns:p14="http://schemas.microsoft.com/office/powerpoint/2010/main" val="3493017140"/>
+      </p:ext>
+    </p:extLst>
+  </p:cSld>
+  <p:clrMapOvr>
+    <a:masterClrMapping/>
+  </p:clrMapOvr>
+</p:sld>
+</file>
+
 <file path=ppt/theme/theme1.xml><?xml version="1.0" encoding="utf-8"?>
 <a:theme xmlns:a="http://schemas.openxmlformats.org/drawingml/2006/main" name="ערכת נושא Office">
   <a:themeElements>

</xml_diff>

<commit_message>
got first results. did spc and k-means + graphs. seems like k means is better but need help with it.
</commit_message>
<xml_diff>
--- a/ניטור סטטיסטי וזיהוי אנומליות - פרויקט - קבוצה 7.pptx
+++ b/ניטור סטטיסטי וזיהוי אנומליות - פרויקט - קבוצה 7.pptx
@@ -11,7 +11,10 @@
     <p:sldId id="259" r:id="rId5"/>
     <p:sldId id="260" r:id="rId6"/>
     <p:sldId id="262" r:id="rId7"/>
-    <p:sldId id="261" r:id="rId8"/>
+    <p:sldId id="263" r:id="rId8"/>
+    <p:sldId id="261" r:id="rId9"/>
+    <p:sldId id="264" r:id="rId10"/>
+    <p:sldId id="265" r:id="rId11"/>
   </p:sldIdLst>
   <p:sldSz cx="12192000" cy="6858000"/>
   <p:notesSz cx="6858000" cy="9144000"/>
@@ -3667,6 +3670,237 @@
 </p:sld>
 </file>
 
+<file path=ppt/slides/slide10.xml><?xml version="1.0" encoding="utf-8"?>
+<p:sld xmlns:a="http://schemas.openxmlformats.org/drawingml/2006/main" xmlns:r="http://schemas.openxmlformats.org/officeDocument/2006/relationships" xmlns:p="http://schemas.openxmlformats.org/presentationml/2006/main">
+  <p:cSld>
+    <p:bg>
+      <p:bgPr>
+        <a:solidFill>
+          <a:schemeClr val="tx1"/>
+        </a:solidFill>
+        <a:effectLst/>
+      </p:bgPr>
+    </p:bg>
+    <p:spTree>
+      <p:nvGrpSpPr>
+        <p:cNvPr id="1" name=""/>
+        <p:cNvGrpSpPr/>
+        <p:nvPr/>
+      </p:nvGrpSpPr>
+      <p:grpSpPr>
+        <a:xfrm>
+          <a:off x="0" y="0"/>
+          <a:ext cx="0" cy="0"/>
+          <a:chOff x="0" y="0"/>
+          <a:chExt cx="0" cy="0"/>
+        </a:xfrm>
+      </p:grpSpPr>
+      <p:sp>
+        <p:nvSpPr>
+          <p:cNvPr id="2" name="כותרת 1">
+            <a:extLst>
+              <a:ext uri="{FF2B5EF4-FFF2-40B4-BE49-F238E27FC236}">
+                <a16:creationId xmlns:a16="http://schemas.microsoft.com/office/drawing/2014/main" id="{AACDF080-84D0-8E5C-CFD9-86AB1B8DAC1C}"/>
+              </a:ext>
+            </a:extLst>
+          </p:cNvPr>
+          <p:cNvSpPr>
+            <a:spLocks noGrp="1"/>
+          </p:cNvSpPr>
+          <p:nvPr>
+            <p:ph type="title"/>
+          </p:nvPr>
+        </p:nvSpPr>
+        <p:spPr>
+          <a:xfrm>
+            <a:off x="4965430" y="629268"/>
+            <a:ext cx="6586491" cy="1286160"/>
+          </a:xfrm>
+        </p:spPr>
+        <p:txBody>
+          <a:bodyPr anchor="b">
+            <a:normAutofit/>
+          </a:bodyPr>
+          <a:lstStyle/>
+          <a:p>
+            <a:r>
+              <a:rPr lang="he-IL" dirty="0">
+                <a:solidFill>
+                  <a:schemeClr val="bg1"/>
+                </a:solidFill>
+              </a:rPr>
+              <a:t>סיכום ומסקנות</a:t>
+            </a:r>
+          </a:p>
+        </p:txBody>
+      </p:sp>
+      <p:sp>
+        <p:nvSpPr>
+          <p:cNvPr id="3" name="מציין מיקום תוכן 2">
+            <a:extLst>
+              <a:ext uri="{FF2B5EF4-FFF2-40B4-BE49-F238E27FC236}">
+                <a16:creationId xmlns:a16="http://schemas.microsoft.com/office/drawing/2014/main" id="{0FE896CA-3DA3-C7C9-06F0-F0EC06FCC3E8}"/>
+              </a:ext>
+            </a:extLst>
+          </p:cNvPr>
+          <p:cNvSpPr>
+            <a:spLocks noGrp="1"/>
+          </p:cNvSpPr>
+          <p:nvPr>
+            <p:ph idx="1"/>
+          </p:nvPr>
+        </p:nvSpPr>
+        <p:spPr>
+          <a:xfrm>
+            <a:off x="4965431" y="2438400"/>
+            <a:ext cx="6586489" cy="3785419"/>
+          </a:xfrm>
+        </p:spPr>
+        <p:txBody>
+          <a:bodyPr>
+            <a:normAutofit/>
+          </a:bodyPr>
+          <a:lstStyle/>
+          <a:p>
+            <a:r>
+              <a:rPr lang="he-IL" sz="2000">
+                <a:solidFill>
+                  <a:schemeClr val="bg1"/>
+                </a:solidFill>
+              </a:rPr>
+              <a:t>גג</a:t>
+            </a:r>
+          </a:p>
+        </p:txBody>
+      </p:sp>
+      <p:pic>
+        <p:nvPicPr>
+          <p:cNvPr id="1026" name="Picture 2">
+            <a:extLst>
+              <a:ext uri="{FF2B5EF4-FFF2-40B4-BE49-F238E27FC236}">
+                <a16:creationId xmlns:a16="http://schemas.microsoft.com/office/drawing/2014/main" id="{B6CD1191-FA2B-5690-916F-2BF4D49C9C31}"/>
+              </a:ext>
+            </a:extLst>
+          </p:cNvPr>
+          <p:cNvPicPr>
+            <a:picLocks noChangeAspect="1" noChangeArrowheads="1"/>
+          </p:cNvPicPr>
+          <p:nvPr/>
+        </p:nvPicPr>
+        <p:blipFill rotWithShape="1">
+          <a:blip r:embed="rId2">
+            <a:clrChange>
+              <a:clrFrom>
+                <a:srgbClr val="FFFFFF"/>
+              </a:clrFrom>
+              <a:clrTo>
+                <a:srgbClr val="FFFFFF">
+                  <a:alpha val="0"/>
+                </a:srgbClr>
+              </a:clrTo>
+            </a:clrChange>
+            <a:duotone>
+              <a:schemeClr val="accent4">
+                <a:shade val="45000"/>
+                <a:satMod val="135000"/>
+              </a:schemeClr>
+              <a:prstClr val="white"/>
+            </a:duotone>
+            <a:extLst>
+              <a:ext uri="{28A0092B-C50C-407E-A947-70E740481C1C}">
+                <a14:useLocalDpi xmlns:a14="http://schemas.microsoft.com/office/drawing/2010/main" val="0"/>
+              </a:ext>
+            </a:extLst>
+          </a:blip>
+          <a:srcRect l="10981" r="4527"/>
+          <a:stretch/>
+        </p:blipFill>
+        <p:spPr bwMode="auto">
+          <a:xfrm>
+            <a:off x="20" y="10"/>
+            <a:ext cx="4635571" cy="6857990"/>
+          </a:xfrm>
+          <a:prstGeom prst="rect">
+            <a:avLst/>
+          </a:prstGeom>
+          <a:noFill/>
+          <a:effectLst/>
+          <a:extLst>
+            <a:ext uri="{909E8E84-426E-40DD-AFC4-6F175D3DCCD1}">
+              <a14:hiddenFill xmlns:a14="http://schemas.microsoft.com/office/drawing/2010/main">
+                <a:solidFill>
+                  <a:srgbClr val="FFFFFF"/>
+                </a:solidFill>
+              </a14:hiddenFill>
+            </a:ext>
+          </a:extLst>
+        </p:spPr>
+      </p:pic>
+      <p:cxnSp>
+        <p:nvCxnSpPr>
+          <p:cNvPr id="1031" name="Straight Connector 1030">
+            <a:extLst>
+              <a:ext uri="{FF2B5EF4-FFF2-40B4-BE49-F238E27FC236}">
+                <a16:creationId xmlns:a16="http://schemas.microsoft.com/office/drawing/2014/main" id="{A7F400EE-A8A5-48AF-B4D6-291B52C6F0B0}"/>
+              </a:ext>
+              <a:ext uri="{C183D7F6-B498-43B3-948B-1728B52AA6E4}">
+                <adec:decorative xmlns:adec="http://schemas.microsoft.com/office/drawing/2017/decorative" val="1"/>
+              </a:ext>
+            </a:extLst>
+          </p:cNvPr>
+          <p:cNvCxnSpPr>
+            <a:cxnSpLocks noGrp="1" noRot="1" noChangeAspect="1" noMove="1" noResize="1" noEditPoints="1" noAdjustHandles="1" noChangeArrowheads="1" noChangeShapeType="1"/>
+          </p:cNvCxnSpPr>
+          <p:nvPr>
+            <p:extLst>
+              <p:ext uri="{386F3935-93C4-4BCD-93E2-E3B085C9AB24}">
+                <p16:designElem xmlns:p16="http://schemas.microsoft.com/office/powerpoint/2015/main" val="1"/>
+              </p:ext>
+            </p:extLst>
+          </p:nvPr>
+        </p:nvCxnSpPr>
+        <p:spPr>
+          <a:xfrm>
+            <a:off x="5080934" y="2115117"/>
+            <a:ext cx="6309360" cy="0"/>
+          </a:xfrm>
+          <a:prstGeom prst="line">
+            <a:avLst/>
+          </a:prstGeom>
+          <a:ln w="19050">
+            <a:solidFill>
+              <a:srgbClr val="E27F34"/>
+            </a:solidFill>
+          </a:ln>
+        </p:spPr>
+        <p:style>
+          <a:lnRef idx="1">
+            <a:schemeClr val="accent1"/>
+          </a:lnRef>
+          <a:fillRef idx="0">
+            <a:schemeClr val="accent1"/>
+          </a:fillRef>
+          <a:effectRef idx="0">
+            <a:schemeClr val="accent1"/>
+          </a:effectRef>
+          <a:fontRef idx="minor">
+            <a:schemeClr val="tx1"/>
+          </a:fontRef>
+        </p:style>
+      </p:cxnSp>
+    </p:spTree>
+    <p:extLst>
+      <p:ext uri="{BB962C8B-B14F-4D97-AF65-F5344CB8AC3E}">
+        <p14:creationId xmlns:p14="http://schemas.microsoft.com/office/powerpoint/2010/main" val="2634370624"/>
+      </p:ext>
+    </p:extLst>
+  </p:cSld>
+  <p:clrMapOvr>
+    <a:masterClrMapping/>
+  </p:clrMapOvr>
+</p:sld>
+</file>
+
 <file path=ppt/slides/slide2.xml><?xml version="1.0" encoding="utf-8"?>
 <p:sld xmlns:a="http://schemas.openxmlformats.org/drawingml/2006/main" xmlns:r="http://schemas.openxmlformats.org/officeDocument/2006/relationships" xmlns:p="http://schemas.openxmlformats.org/presentationml/2006/main">
   <p:cSld>
@@ -5897,7 +6131,7 @@
         </p:spPr>
         <p:txBody>
           <a:bodyPr>
-            <a:normAutofit/>
+            <a:normAutofit fontScale="85000" lnSpcReduction="20000"/>
           </a:bodyPr>
           <a:lstStyle/>
           <a:p>
@@ -6107,7 +6341,7 @@
                   <a:schemeClr val="bg1"/>
                 </a:solidFill>
               </a:rPr>
-              <a:t>נחשב את גבולות הבקרה.</a:t>
+              <a:t>נחשב את גבולות הבקרה – נעשה את זה עבור כל חנות בנפרד.</a:t>
             </a:r>
           </a:p>
           <a:p>
@@ -6118,6 +6352,26 @@
                 </a:solidFill>
               </a:rPr>
               <a:t>נבנה את תרשים הבקרה.</a:t>
+            </a:r>
+          </a:p>
+          <a:p>
+            <a:r>
+              <a:rPr lang="he-IL" sz="2000" dirty="0">
+                <a:solidFill>
+                  <a:schemeClr val="bg1"/>
+                </a:solidFill>
+              </a:rPr>
+              <a:t>בהינתן חריגות כלפי מטה: נבדוק אילו חנויות היו במדגם, ונתייג אותן כחנויות עם ביצועים נמוכים.</a:t>
+            </a:r>
+          </a:p>
+          <a:p>
+            <a:r>
+              <a:rPr lang="he-IL" sz="2000" dirty="0">
+                <a:solidFill>
+                  <a:schemeClr val="bg1"/>
+                </a:solidFill>
+              </a:rPr>
+              <a:t>בהינתן חריגות כלפי מעלה: נבדוק אילו חנויות היו במדגם, ונתייג אותן כחנויות מצטיינות.</a:t>
             </a:r>
           </a:p>
         </p:txBody>
@@ -6647,6 +6901,93 @@
 <file path=ppt/slides/slide7.xml><?xml version="1.0" encoding="utf-8"?>
 <p:sld xmlns:a="http://schemas.openxmlformats.org/drawingml/2006/main" xmlns:r="http://schemas.openxmlformats.org/officeDocument/2006/relationships" xmlns:p="http://schemas.openxmlformats.org/presentationml/2006/main">
   <p:cSld>
+    <p:spTree>
+      <p:nvGrpSpPr>
+        <p:cNvPr id="1" name=""/>
+        <p:cNvGrpSpPr/>
+        <p:nvPr/>
+      </p:nvGrpSpPr>
+      <p:grpSpPr>
+        <a:xfrm>
+          <a:off x="0" y="0"/>
+          <a:ext cx="0" cy="0"/>
+          <a:chOff x="0" y="0"/>
+          <a:chExt cx="0" cy="0"/>
+        </a:xfrm>
+      </p:grpSpPr>
+      <p:sp>
+        <p:nvSpPr>
+          <p:cNvPr id="2" name="כותרת 1">
+            <a:extLst>
+              <a:ext uri="{FF2B5EF4-FFF2-40B4-BE49-F238E27FC236}">
+                <a16:creationId xmlns:a16="http://schemas.microsoft.com/office/drawing/2014/main" id="{E6A30C65-0929-0D4F-F8D9-1E7EA8D09084}"/>
+              </a:ext>
+            </a:extLst>
+          </p:cNvPr>
+          <p:cNvSpPr>
+            <a:spLocks noGrp="1"/>
+          </p:cNvSpPr>
+          <p:nvPr>
+            <p:ph type="title"/>
+          </p:nvPr>
+        </p:nvSpPr>
+        <p:spPr/>
+        <p:txBody>
+          <a:bodyPr/>
+          <a:lstStyle/>
+          <a:p>
+            <a:r>
+              <a:rPr lang="en-US" dirty="0"/>
+              <a:t>SPC</a:t>
+            </a:r>
+            <a:r>
+              <a:rPr lang="he-IL" dirty="0"/>
+              <a:t> - תוצאות</a:t>
+            </a:r>
+          </a:p>
+        </p:txBody>
+      </p:sp>
+      <p:sp>
+        <p:nvSpPr>
+          <p:cNvPr id="3" name="מציין מיקום תוכן 2">
+            <a:extLst>
+              <a:ext uri="{FF2B5EF4-FFF2-40B4-BE49-F238E27FC236}">
+                <a16:creationId xmlns:a16="http://schemas.microsoft.com/office/drawing/2014/main" id="{3765DC31-378D-9134-F037-0D613F197A24}"/>
+              </a:ext>
+            </a:extLst>
+          </p:cNvPr>
+          <p:cNvSpPr>
+            <a:spLocks noGrp="1"/>
+          </p:cNvSpPr>
+          <p:nvPr>
+            <p:ph idx="1"/>
+          </p:nvPr>
+        </p:nvSpPr>
+        <p:spPr/>
+        <p:txBody>
+          <a:bodyPr/>
+          <a:lstStyle/>
+          <a:p>
+            <a:endParaRPr lang="he-IL"/>
+          </a:p>
+        </p:txBody>
+      </p:sp>
+    </p:spTree>
+    <p:extLst>
+      <p:ext uri="{BB962C8B-B14F-4D97-AF65-F5344CB8AC3E}">
+        <p14:creationId xmlns:p14="http://schemas.microsoft.com/office/powerpoint/2010/main" val="1063081806"/>
+      </p:ext>
+    </p:extLst>
+  </p:cSld>
+  <p:clrMapOvr>
+    <a:masterClrMapping/>
+  </p:clrMapOvr>
+</p:sld>
+</file>
+
+<file path=ppt/slides/slide8.xml><?xml version="1.0" encoding="utf-8"?>
+<p:sld xmlns:a="http://schemas.openxmlformats.org/drawingml/2006/main" xmlns:r="http://schemas.openxmlformats.org/officeDocument/2006/relationships" xmlns:p="http://schemas.openxmlformats.org/presentationml/2006/main">
+  <p:cSld>
     <p:bg>
       <p:bgPr>
         <a:solidFill>
@@ -6716,8 +7057,8 @@
           </a:p>
         </p:txBody>
       </p:sp>
-      <mc:AlternateContent xmlns:mc="http://schemas.openxmlformats.org/markup-compatibility/2006">
-        <mc:Choice xmlns:a14="http://schemas.microsoft.com/office/drawing/2010/main" Requires="a14">
+      <mc:AlternateContent xmlns:mc="http://schemas.openxmlformats.org/markup-compatibility/2006" xmlns:a14="http://schemas.microsoft.com/office/drawing/2010/main">
+        <mc:Choice Requires="a14">
           <p:sp>
             <p:nvSpPr>
               <p:cNvPr id="3" name="מציין מיקום תוכן 2">
@@ -7229,7 +7570,7 @@
             </p:txBody>
           </p:sp>
         </mc:Choice>
-        <mc:Fallback>
+        <mc:Fallback xmlns="">
           <p:sp>
             <p:nvSpPr>
               <p:cNvPr id="3" name="מציין מיקום תוכן 2">
@@ -7359,6 +7700,93 @@
     <p:extLst>
       <p:ext uri="{BB962C8B-B14F-4D97-AF65-F5344CB8AC3E}">
         <p14:creationId xmlns:p14="http://schemas.microsoft.com/office/powerpoint/2010/main" val="3493017140"/>
+      </p:ext>
+    </p:extLst>
+  </p:cSld>
+  <p:clrMapOvr>
+    <a:masterClrMapping/>
+  </p:clrMapOvr>
+</p:sld>
+</file>
+
+<file path=ppt/slides/slide9.xml><?xml version="1.0" encoding="utf-8"?>
+<p:sld xmlns:a="http://schemas.openxmlformats.org/drawingml/2006/main" xmlns:r="http://schemas.openxmlformats.org/officeDocument/2006/relationships" xmlns:p="http://schemas.openxmlformats.org/presentationml/2006/main">
+  <p:cSld>
+    <p:spTree>
+      <p:nvGrpSpPr>
+        <p:cNvPr id="1" name=""/>
+        <p:cNvGrpSpPr/>
+        <p:nvPr/>
+      </p:nvGrpSpPr>
+      <p:grpSpPr>
+        <a:xfrm>
+          <a:off x="0" y="0"/>
+          <a:ext cx="0" cy="0"/>
+          <a:chOff x="0" y="0"/>
+          <a:chExt cx="0" cy="0"/>
+        </a:xfrm>
+      </p:grpSpPr>
+      <p:sp>
+        <p:nvSpPr>
+          <p:cNvPr id="2" name="כותרת 1">
+            <a:extLst>
+              <a:ext uri="{FF2B5EF4-FFF2-40B4-BE49-F238E27FC236}">
+                <a16:creationId xmlns:a16="http://schemas.microsoft.com/office/drawing/2014/main" id="{088B65DE-3279-1C35-7854-16060905B77B}"/>
+              </a:ext>
+            </a:extLst>
+          </p:cNvPr>
+          <p:cNvSpPr>
+            <a:spLocks noGrp="1"/>
+          </p:cNvSpPr>
+          <p:nvPr>
+            <p:ph type="title"/>
+          </p:nvPr>
+        </p:nvSpPr>
+        <p:spPr/>
+        <p:txBody>
+          <a:bodyPr/>
+          <a:lstStyle/>
+          <a:p>
+            <a:r>
+              <a:rPr lang="en-US" dirty="0"/>
+              <a:t>K-Means Clustering</a:t>
+            </a:r>
+            <a:r>
+              <a:rPr lang="he-IL" dirty="0"/>
+              <a:t> - תוצאות</a:t>
+            </a:r>
+          </a:p>
+        </p:txBody>
+      </p:sp>
+      <p:sp>
+        <p:nvSpPr>
+          <p:cNvPr id="3" name="מציין מיקום תוכן 2">
+            <a:extLst>
+              <a:ext uri="{FF2B5EF4-FFF2-40B4-BE49-F238E27FC236}">
+                <a16:creationId xmlns:a16="http://schemas.microsoft.com/office/drawing/2014/main" id="{D7A2C672-9012-4AC5-DAB2-10BEB6E392A3}"/>
+              </a:ext>
+            </a:extLst>
+          </p:cNvPr>
+          <p:cNvSpPr>
+            <a:spLocks noGrp="1"/>
+          </p:cNvSpPr>
+          <p:nvPr>
+            <p:ph idx="1"/>
+          </p:nvPr>
+        </p:nvSpPr>
+        <p:spPr/>
+        <p:txBody>
+          <a:bodyPr/>
+          <a:lstStyle/>
+          <a:p>
+            <a:endParaRPr lang="he-IL"/>
+          </a:p>
+        </p:txBody>
+      </p:sp>
+    </p:spTree>
+    <p:extLst>
+      <p:ext uri="{BB962C8B-B14F-4D97-AF65-F5344CB8AC3E}">
+        <p14:creationId xmlns:p14="http://schemas.microsoft.com/office/powerpoint/2010/main" val="280463639"/>
       </p:ext>
     </p:extLst>
   </p:cSld>

</xml_diff>